<commit_message>
Added Goldman Image slide 2
.. since they did the analysis (presumably). Corrected minor typo in
notes on same slide ("estimated").
</commit_message>
<xml_diff>
--- a/2015_CLRS.pptx
+++ b/2015_CLRS.pptx
@@ -125,6 +125,11 @@
       </a:defRPr>
     </a:lvl9pPr>
   </p:defaultTextStyle>
+  <p:extLst>
+    <p:ext uri="{EFAFB233-063F-42B5-8137-9DF3F51BA10A}">
+      <p15:sldGuideLst xmlns:p15="http://schemas.microsoft.com/office/powerpoint/2012/main"/>
+    </p:ext>
+  </p:extLst>
 </p:presentation>
 </file>
 
@@ -1009,6 +1014,13 @@
         </dgm:presLayoutVars>
       </dgm:prSet>
       <dgm:spPr/>
+      <dgm:t>
+        <a:bodyPr/>
+        <a:lstStyle/>
+        <a:p>
+          <a:endParaRPr lang="en-US"/>
+        </a:p>
+      </dgm:t>
     </dgm:pt>
     <dgm:pt modelId="{3C5199D7-1D93-4271-9DF9-1AC674C1F187}" type="pres">
       <dgm:prSet presAssocID="{7A73708B-A80D-4D51-A78C-6A9967F47584}" presName="gear1" presStyleLbl="node1" presStyleIdx="0" presStyleCnt="3">
@@ -1029,10 +1041,24 @@
     <dgm:pt modelId="{DCDA8B26-E4BB-4FFB-BF63-7D7BAD72F6CA}" type="pres">
       <dgm:prSet presAssocID="{7A73708B-A80D-4D51-A78C-6A9967F47584}" presName="gear1srcNode" presStyleLbl="node1" presStyleIdx="0" presStyleCnt="3"/>
       <dgm:spPr/>
+      <dgm:t>
+        <a:bodyPr/>
+        <a:lstStyle/>
+        <a:p>
+          <a:endParaRPr lang="en-US"/>
+        </a:p>
+      </dgm:t>
     </dgm:pt>
     <dgm:pt modelId="{3BBEBE08-BF62-4A70-9275-4D7FCF686FB0}" type="pres">
       <dgm:prSet presAssocID="{7A73708B-A80D-4D51-A78C-6A9967F47584}" presName="gear1dstNode" presStyleLbl="node1" presStyleIdx="0" presStyleCnt="3"/>
       <dgm:spPr/>
+      <dgm:t>
+        <a:bodyPr/>
+        <a:lstStyle/>
+        <a:p>
+          <a:endParaRPr lang="en-US"/>
+        </a:p>
+      </dgm:t>
     </dgm:pt>
     <dgm:pt modelId="{D485BBE8-F8BF-41AD-914C-1C203D6E82FF}" type="pres">
       <dgm:prSet presAssocID="{6359EC4B-25FF-401F-9B3C-32081811BE67}" presName="gear2" presStyleLbl="node1" presStyleIdx="1" presStyleCnt="3">
@@ -1042,14 +1068,35 @@
         </dgm:presLayoutVars>
       </dgm:prSet>
       <dgm:spPr/>
+      <dgm:t>
+        <a:bodyPr/>
+        <a:lstStyle/>
+        <a:p>
+          <a:endParaRPr lang="en-US"/>
+        </a:p>
+      </dgm:t>
     </dgm:pt>
     <dgm:pt modelId="{3F6105AC-FE4C-4E28-880E-9E4158957B7D}" type="pres">
       <dgm:prSet presAssocID="{6359EC4B-25FF-401F-9B3C-32081811BE67}" presName="gear2srcNode" presStyleLbl="node1" presStyleIdx="1" presStyleCnt="3"/>
       <dgm:spPr/>
+      <dgm:t>
+        <a:bodyPr/>
+        <a:lstStyle/>
+        <a:p>
+          <a:endParaRPr lang="en-US"/>
+        </a:p>
+      </dgm:t>
     </dgm:pt>
     <dgm:pt modelId="{1F8C19DA-2A82-423D-A129-C46CC12D3DBE}" type="pres">
       <dgm:prSet presAssocID="{6359EC4B-25FF-401F-9B3C-32081811BE67}" presName="gear2dstNode" presStyleLbl="node1" presStyleIdx="1" presStyleCnt="3"/>
       <dgm:spPr/>
+      <dgm:t>
+        <a:bodyPr/>
+        <a:lstStyle/>
+        <a:p>
+          <a:endParaRPr lang="en-US"/>
+        </a:p>
+      </dgm:t>
     </dgm:pt>
     <dgm:pt modelId="{AF00894D-C69B-4B56-B57D-7E9B3EF03F89}" type="pres">
       <dgm:prSet presAssocID="{FDC92FA5-E249-47D8-A68F-DC2F5EFC8FC0}" presName="gear3" presStyleLbl="node1" presStyleIdx="2" presStyleCnt="3"/>
@@ -1081,42 +1128,77 @@
     <dgm:pt modelId="{6DCCBD9A-F0B4-4EB7-8DA6-2C09E9A9D47A}" type="pres">
       <dgm:prSet presAssocID="{FDC92FA5-E249-47D8-A68F-DC2F5EFC8FC0}" presName="gear3srcNode" presStyleLbl="node1" presStyleIdx="2" presStyleCnt="3"/>
       <dgm:spPr/>
+      <dgm:t>
+        <a:bodyPr/>
+        <a:lstStyle/>
+        <a:p>
+          <a:endParaRPr lang="en-US"/>
+        </a:p>
+      </dgm:t>
     </dgm:pt>
     <dgm:pt modelId="{9CED87F8-F656-4477-8AE3-8D6E3BB27783}" type="pres">
       <dgm:prSet presAssocID="{FDC92FA5-E249-47D8-A68F-DC2F5EFC8FC0}" presName="gear3dstNode" presStyleLbl="node1" presStyleIdx="2" presStyleCnt="3"/>
       <dgm:spPr/>
+      <dgm:t>
+        <a:bodyPr/>
+        <a:lstStyle/>
+        <a:p>
+          <a:endParaRPr lang="en-US"/>
+        </a:p>
+      </dgm:t>
     </dgm:pt>
     <dgm:pt modelId="{F0F4C72F-0AD2-41A6-A52F-EE0874430483}" type="pres">
       <dgm:prSet presAssocID="{0362546E-DAC8-425C-9C7F-A88A95F12640}" presName="connector1" presStyleLbl="sibTrans2D1" presStyleIdx="0" presStyleCnt="3"/>
       <dgm:spPr/>
+      <dgm:t>
+        <a:bodyPr/>
+        <a:lstStyle/>
+        <a:p>
+          <a:endParaRPr lang="en-US"/>
+        </a:p>
+      </dgm:t>
     </dgm:pt>
     <dgm:pt modelId="{B8609929-57CA-4F2D-92EC-DB686F09C98F}" type="pres">
       <dgm:prSet presAssocID="{B93848F4-E476-4CE6-8C46-3FB3B4815CC6}" presName="connector2" presStyleLbl="sibTrans2D1" presStyleIdx="1" presStyleCnt="3"/>
       <dgm:spPr/>
+      <dgm:t>
+        <a:bodyPr/>
+        <a:lstStyle/>
+        <a:p>
+          <a:endParaRPr lang="en-US"/>
+        </a:p>
+      </dgm:t>
     </dgm:pt>
     <dgm:pt modelId="{A1D0E260-73D8-4E44-994B-6B4F3D3C63D9}" type="pres">
       <dgm:prSet presAssocID="{7195C6A4-78EB-48F2-8CFF-D19F9E6846BD}" presName="connector3" presStyleLbl="sibTrans2D1" presStyleIdx="2" presStyleCnt="3"/>
       <dgm:spPr/>
+      <dgm:t>
+        <a:bodyPr/>
+        <a:lstStyle/>
+        <a:p>
+          <a:endParaRPr lang="en-US"/>
+        </a:p>
+      </dgm:t>
     </dgm:pt>
   </dgm:ptLst>
   <dgm:cxnLst>
+    <dgm:cxn modelId="{E09019EA-4AE8-4B1B-A92A-262462CDD531}" srcId="{9C82F72C-C9C6-417E-94F3-FE4F163228B4}" destId="{FDC92FA5-E249-47D8-A68F-DC2F5EFC8FC0}" srcOrd="2" destOrd="0" parTransId="{E579882E-34E7-4E1F-9E49-8F3AB9BD97AE}" sibTransId="{7195C6A4-78EB-48F2-8CFF-D19F9E6846BD}"/>
+    <dgm:cxn modelId="{B29CC9E3-17E8-4630-AFC8-CC6A1F1BC675}" srcId="{9C82F72C-C9C6-417E-94F3-FE4F163228B4}" destId="{6359EC4B-25FF-401F-9B3C-32081811BE67}" srcOrd="1" destOrd="0" parTransId="{CC31E0AB-D334-4D09-9CB9-1053EB2A4225}" sibTransId="{B93848F4-E476-4CE6-8C46-3FB3B4815CC6}"/>
+    <dgm:cxn modelId="{70A324FE-03DB-4E6A-BED6-A31B72EC80DC}" type="presOf" srcId="{7A73708B-A80D-4D51-A78C-6A9967F47584}" destId="{3BBEBE08-BF62-4A70-9275-4D7FCF686FB0}" srcOrd="2" destOrd="0" presId="urn:microsoft.com/office/officeart/2005/8/layout/gear1"/>
+    <dgm:cxn modelId="{E5D89579-A757-41A9-B2F5-9E23CAD6CA20}" type="presOf" srcId="{7A73708B-A80D-4D51-A78C-6A9967F47584}" destId="{DCDA8B26-E4BB-4FFB-BF63-7D7BAD72F6CA}" srcOrd="1" destOrd="0" presId="urn:microsoft.com/office/officeart/2005/8/layout/gear1"/>
     <dgm:cxn modelId="{18EFDD23-8C36-4C96-BBBD-45EB01021A01}" type="presOf" srcId="{B93848F4-E476-4CE6-8C46-3FB3B4815CC6}" destId="{B8609929-57CA-4F2D-92EC-DB686F09C98F}" srcOrd="0" destOrd="0" presId="urn:microsoft.com/office/officeart/2005/8/layout/gear1"/>
+    <dgm:cxn modelId="{D63B256B-A3EF-430B-B0E6-F82BDEFD9571}" type="presOf" srcId="{FDC92FA5-E249-47D8-A68F-DC2F5EFC8FC0}" destId="{80B7E18E-4168-4742-89F1-34D96C2E305A}" srcOrd="1" destOrd="0" presId="urn:microsoft.com/office/officeart/2005/8/layout/gear1"/>
+    <dgm:cxn modelId="{CEEBCA38-B6D6-42FF-9F29-6A5D67B9B73F}" type="presOf" srcId="{7195C6A4-78EB-48F2-8CFF-D19F9E6846BD}" destId="{A1D0E260-73D8-4E44-994B-6B4F3D3C63D9}" srcOrd="0" destOrd="0" presId="urn:microsoft.com/office/officeart/2005/8/layout/gear1"/>
+    <dgm:cxn modelId="{C2A994FD-4ED9-4C4B-8CAA-F4B362F97718}" type="presOf" srcId="{FDC92FA5-E249-47D8-A68F-DC2F5EFC8FC0}" destId="{6DCCBD9A-F0B4-4EB7-8DA6-2C09E9A9D47A}" srcOrd="2" destOrd="0" presId="urn:microsoft.com/office/officeart/2005/8/layout/gear1"/>
+    <dgm:cxn modelId="{92995297-52C4-448B-B237-4405FA7A098F}" type="presOf" srcId="{FDC92FA5-E249-47D8-A68F-DC2F5EFC8FC0}" destId="{AF00894D-C69B-4B56-B57D-7E9B3EF03F89}" srcOrd="0" destOrd="0" presId="urn:microsoft.com/office/officeart/2005/8/layout/gear1"/>
+    <dgm:cxn modelId="{DADD764D-A87F-4BED-922D-BE36FFF2FFAA}" type="presOf" srcId="{0362546E-DAC8-425C-9C7F-A88A95F12640}" destId="{F0F4C72F-0AD2-41A6-A52F-EE0874430483}" srcOrd="0" destOrd="0" presId="urn:microsoft.com/office/officeart/2005/8/layout/gear1"/>
+    <dgm:cxn modelId="{4E56123C-2620-46B6-960D-C09B5D4B45C1}" type="presOf" srcId="{6359EC4B-25FF-401F-9B3C-32081811BE67}" destId="{1F8C19DA-2A82-423D-A129-C46CC12D3DBE}" srcOrd="2" destOrd="0" presId="urn:microsoft.com/office/officeart/2005/8/layout/gear1"/>
+    <dgm:cxn modelId="{265C03AC-C508-40AC-A67A-3868D019899A}" type="presOf" srcId="{FDC92FA5-E249-47D8-A68F-DC2F5EFC8FC0}" destId="{9CED87F8-F656-4477-8AE3-8D6E3BB27783}" srcOrd="3" destOrd="0" presId="urn:microsoft.com/office/officeart/2005/8/layout/gear1"/>
+    <dgm:cxn modelId="{11B6898C-6973-4DCA-99BA-F56799D90FD1}" srcId="{9C82F72C-C9C6-417E-94F3-FE4F163228B4}" destId="{7A73708B-A80D-4D51-A78C-6A9967F47584}" srcOrd="0" destOrd="0" parTransId="{5FC7D5F5-DFCB-4D7F-AE6B-24D04436EF31}" sibTransId="{0362546E-DAC8-425C-9C7F-A88A95F12640}"/>
     <dgm:cxn modelId="{80A4C92E-38E3-4699-A461-7EB13E455006}" type="presOf" srcId="{7A73708B-A80D-4D51-A78C-6A9967F47584}" destId="{3C5199D7-1D93-4271-9DF9-1AC674C1F187}" srcOrd="0" destOrd="0" presId="urn:microsoft.com/office/officeart/2005/8/layout/gear1"/>
     <dgm:cxn modelId="{73B3FE0D-A83E-4B76-AD93-79C0E1F127BF}" type="presOf" srcId="{6359EC4B-25FF-401F-9B3C-32081811BE67}" destId="{D485BBE8-F8BF-41AD-914C-1C203D6E82FF}" srcOrd="0" destOrd="0" presId="urn:microsoft.com/office/officeart/2005/8/layout/gear1"/>
-    <dgm:cxn modelId="{CEEBCA38-B6D6-42FF-9F29-6A5D67B9B73F}" type="presOf" srcId="{7195C6A4-78EB-48F2-8CFF-D19F9E6846BD}" destId="{A1D0E260-73D8-4E44-994B-6B4F3D3C63D9}" srcOrd="0" destOrd="0" presId="urn:microsoft.com/office/officeart/2005/8/layout/gear1"/>
-    <dgm:cxn modelId="{DADD764D-A87F-4BED-922D-BE36FFF2FFAA}" type="presOf" srcId="{0362546E-DAC8-425C-9C7F-A88A95F12640}" destId="{F0F4C72F-0AD2-41A6-A52F-EE0874430483}" srcOrd="0" destOrd="0" presId="urn:microsoft.com/office/officeart/2005/8/layout/gear1"/>
     <dgm:cxn modelId="{3BE2F872-421C-484A-B9EE-60226D47F56E}" type="presOf" srcId="{9C82F72C-C9C6-417E-94F3-FE4F163228B4}" destId="{FD78A960-2ACB-4115-9429-DAAA27AC092E}" srcOrd="0" destOrd="0" presId="urn:microsoft.com/office/officeart/2005/8/layout/gear1"/>
     <dgm:cxn modelId="{D04C0AB9-017E-40F0-B191-3E404D16DFC3}" type="presOf" srcId="{6359EC4B-25FF-401F-9B3C-32081811BE67}" destId="{3F6105AC-FE4C-4E28-880E-9E4158957B7D}" srcOrd="1" destOrd="0" presId="urn:microsoft.com/office/officeart/2005/8/layout/gear1"/>
-    <dgm:cxn modelId="{C2A994FD-4ED9-4C4B-8CAA-F4B362F97718}" type="presOf" srcId="{FDC92FA5-E249-47D8-A68F-DC2F5EFC8FC0}" destId="{6DCCBD9A-F0B4-4EB7-8DA6-2C09E9A9D47A}" srcOrd="2" destOrd="0" presId="urn:microsoft.com/office/officeart/2005/8/layout/gear1"/>
-    <dgm:cxn modelId="{D63B256B-A3EF-430B-B0E6-F82BDEFD9571}" type="presOf" srcId="{FDC92FA5-E249-47D8-A68F-DC2F5EFC8FC0}" destId="{80B7E18E-4168-4742-89F1-34D96C2E305A}" srcOrd="1" destOrd="0" presId="urn:microsoft.com/office/officeart/2005/8/layout/gear1"/>
-    <dgm:cxn modelId="{4E56123C-2620-46B6-960D-C09B5D4B45C1}" type="presOf" srcId="{6359EC4B-25FF-401F-9B3C-32081811BE67}" destId="{1F8C19DA-2A82-423D-A129-C46CC12D3DBE}" srcOrd="2" destOrd="0" presId="urn:microsoft.com/office/officeart/2005/8/layout/gear1"/>
-    <dgm:cxn modelId="{E5D89579-A757-41A9-B2F5-9E23CAD6CA20}" type="presOf" srcId="{7A73708B-A80D-4D51-A78C-6A9967F47584}" destId="{DCDA8B26-E4BB-4FFB-BF63-7D7BAD72F6CA}" srcOrd="1" destOrd="0" presId="urn:microsoft.com/office/officeart/2005/8/layout/gear1"/>
-    <dgm:cxn modelId="{11B6898C-6973-4DCA-99BA-F56799D90FD1}" srcId="{9C82F72C-C9C6-417E-94F3-FE4F163228B4}" destId="{7A73708B-A80D-4D51-A78C-6A9967F47584}" srcOrd="0" destOrd="0" parTransId="{5FC7D5F5-DFCB-4D7F-AE6B-24D04436EF31}" sibTransId="{0362546E-DAC8-425C-9C7F-A88A95F12640}"/>
-    <dgm:cxn modelId="{92995297-52C4-448B-B237-4405FA7A098F}" type="presOf" srcId="{FDC92FA5-E249-47D8-A68F-DC2F5EFC8FC0}" destId="{AF00894D-C69B-4B56-B57D-7E9B3EF03F89}" srcOrd="0" destOrd="0" presId="urn:microsoft.com/office/officeart/2005/8/layout/gear1"/>
-    <dgm:cxn modelId="{70A324FE-03DB-4E6A-BED6-A31B72EC80DC}" type="presOf" srcId="{7A73708B-A80D-4D51-A78C-6A9967F47584}" destId="{3BBEBE08-BF62-4A70-9275-4D7FCF686FB0}" srcOrd="2" destOrd="0" presId="urn:microsoft.com/office/officeart/2005/8/layout/gear1"/>
-    <dgm:cxn modelId="{E09019EA-4AE8-4B1B-A92A-262462CDD531}" srcId="{9C82F72C-C9C6-417E-94F3-FE4F163228B4}" destId="{FDC92FA5-E249-47D8-A68F-DC2F5EFC8FC0}" srcOrd="2" destOrd="0" parTransId="{E579882E-34E7-4E1F-9E49-8F3AB9BD97AE}" sibTransId="{7195C6A4-78EB-48F2-8CFF-D19F9E6846BD}"/>
-    <dgm:cxn modelId="{265C03AC-C508-40AC-A67A-3868D019899A}" type="presOf" srcId="{FDC92FA5-E249-47D8-A68F-DC2F5EFC8FC0}" destId="{9CED87F8-F656-4477-8AE3-8D6E3BB27783}" srcOrd="3" destOrd="0" presId="urn:microsoft.com/office/officeart/2005/8/layout/gear1"/>
-    <dgm:cxn modelId="{B29CC9E3-17E8-4630-AFC8-CC6A1F1BC675}" srcId="{9C82F72C-C9C6-417E-94F3-FE4F163228B4}" destId="{6359EC4B-25FF-401F-9B3C-32081811BE67}" srcOrd="1" destOrd="0" parTransId="{CC31E0AB-D334-4D09-9CB9-1053EB2A4225}" sibTransId="{B93848F4-E476-4CE6-8C46-3FB3B4815CC6}"/>
     <dgm:cxn modelId="{276F6F67-9363-4E8A-A1E0-2DAE9AA6CE9D}" type="presParOf" srcId="{FD78A960-2ACB-4115-9429-DAAA27AC092E}" destId="{3C5199D7-1D93-4271-9DF9-1AC674C1F187}" srcOrd="0" destOrd="0" presId="urn:microsoft.com/office/officeart/2005/8/layout/gear1"/>
     <dgm:cxn modelId="{746C5298-38F9-4C0B-B23A-5D6296A2B472}" type="presParOf" srcId="{FD78A960-2ACB-4115-9429-DAAA27AC092E}" destId="{DCDA8B26-E4BB-4FFB-BF63-7D7BAD72F6CA}" srcOrd="1" destOrd="0" presId="urn:microsoft.com/office/officeart/2005/8/layout/gear1"/>
     <dgm:cxn modelId="{EEABE59E-97C9-4DAA-A43D-0A81CE943A15}" type="presParOf" srcId="{FD78A960-2ACB-4115-9429-DAAA27AC092E}" destId="{3BBEBE08-BF62-4A70-9275-4D7FCF686FB0}" srcOrd="2" destOrd="0" presId="urn:microsoft.com/office/officeart/2005/8/layout/gear1"/>
@@ -3120,7 +3202,7 @@
           <a:p>
             <a:fld id="{F6883597-B14F-4316-96C8-8EF59AEB1C81}" type="datetimeFigureOut">
               <a:rPr lang="en-US" smtClean="0"/>
-              <a:t>8/16/2015</a:t>
+              <a:t>8/17/2015</a:t>
             </a:fld>
             <a:endParaRPr lang="en-US"/>
           </a:p>
@@ -3459,7 +3541,11 @@
             </a:r>
             <a:r>
               <a:rPr lang="en-US" dirty="0" smtClean="0"/>
-              <a:t>. Goldman Sachs had estimate </a:t>
+              <a:t>. Goldman Sachs had </a:t>
+            </a:r>
+            <a:r>
+              <a:rPr lang="en-US" dirty="0" smtClean="0"/>
+              <a:t>estimated </a:t>
             </a:r>
             <a:r>
               <a:rPr lang="en-US" dirty="0" err="1" smtClean="0"/>
@@ -3914,7 +4000,7 @@
           <a:p>
             <a:fld id="{C53C08D9-299C-46BC-8AE9-A81AD6C54D5C}" type="datetimeFigureOut">
               <a:rPr lang="en-US" smtClean="0"/>
-              <a:t>8/16/2015</a:t>
+              <a:t>8/17/2015</a:t>
             </a:fld>
             <a:endParaRPr lang="en-US"/>
           </a:p>
@@ -4084,7 +4170,7 @@
           <a:p>
             <a:fld id="{C53C08D9-299C-46BC-8AE9-A81AD6C54D5C}" type="datetimeFigureOut">
               <a:rPr lang="en-US" smtClean="0"/>
-              <a:t>8/16/2015</a:t>
+              <a:t>8/17/2015</a:t>
             </a:fld>
             <a:endParaRPr lang="en-US"/>
           </a:p>
@@ -4264,7 +4350,7 @@
           <a:p>
             <a:fld id="{C53C08D9-299C-46BC-8AE9-A81AD6C54D5C}" type="datetimeFigureOut">
               <a:rPr lang="en-US" smtClean="0"/>
-              <a:t>8/16/2015</a:t>
+              <a:t>8/17/2015</a:t>
             </a:fld>
             <a:endParaRPr lang="en-US"/>
           </a:p>
@@ -4434,7 +4520,7 @@
           <a:p>
             <a:fld id="{C53C08D9-299C-46BC-8AE9-A81AD6C54D5C}" type="datetimeFigureOut">
               <a:rPr lang="en-US" smtClean="0"/>
-              <a:t>8/16/2015</a:t>
+              <a:t>8/17/2015</a:t>
             </a:fld>
             <a:endParaRPr lang="en-US"/>
           </a:p>
@@ -4680,7 +4766,7 @@
           <a:p>
             <a:fld id="{C53C08D9-299C-46BC-8AE9-A81AD6C54D5C}" type="datetimeFigureOut">
               <a:rPr lang="en-US" smtClean="0"/>
-              <a:t>8/16/2015</a:t>
+              <a:t>8/17/2015</a:t>
             </a:fld>
             <a:endParaRPr lang="en-US"/>
           </a:p>
@@ -4912,7 +4998,7 @@
           <a:p>
             <a:fld id="{C53C08D9-299C-46BC-8AE9-A81AD6C54D5C}" type="datetimeFigureOut">
               <a:rPr lang="en-US" smtClean="0"/>
-              <a:t>8/16/2015</a:t>
+              <a:t>8/17/2015</a:t>
             </a:fld>
             <a:endParaRPr lang="en-US"/>
           </a:p>
@@ -5279,7 +5365,7 @@
           <a:p>
             <a:fld id="{C53C08D9-299C-46BC-8AE9-A81AD6C54D5C}" type="datetimeFigureOut">
               <a:rPr lang="en-US" smtClean="0"/>
-              <a:t>8/16/2015</a:t>
+              <a:t>8/17/2015</a:t>
             </a:fld>
             <a:endParaRPr lang="en-US"/>
           </a:p>
@@ -5397,7 +5483,7 @@
           <a:p>
             <a:fld id="{C53C08D9-299C-46BC-8AE9-A81AD6C54D5C}" type="datetimeFigureOut">
               <a:rPr lang="en-US" smtClean="0"/>
-              <a:t>8/16/2015</a:t>
+              <a:t>8/17/2015</a:t>
             </a:fld>
             <a:endParaRPr lang="en-US"/>
           </a:p>
@@ -5492,7 +5578,7 @@
           <a:p>
             <a:fld id="{C53C08D9-299C-46BC-8AE9-A81AD6C54D5C}" type="datetimeFigureOut">
               <a:rPr lang="en-US" smtClean="0"/>
-              <a:t>8/16/2015</a:t>
+              <a:t>8/17/2015</a:t>
             </a:fld>
             <a:endParaRPr lang="en-US"/>
           </a:p>
@@ -5769,7 +5855,7 @@
           <a:p>
             <a:fld id="{C53C08D9-299C-46BC-8AE9-A81AD6C54D5C}" type="datetimeFigureOut">
               <a:rPr lang="en-US" smtClean="0"/>
-              <a:t>8/16/2015</a:t>
+              <a:t>8/17/2015</a:t>
             </a:fld>
             <a:endParaRPr lang="en-US"/>
           </a:p>
@@ -6022,7 +6108,7 @@
           <a:p>
             <a:fld id="{C53C08D9-299C-46BC-8AE9-A81AD6C54D5C}" type="datetimeFigureOut">
               <a:rPr lang="en-US" smtClean="0"/>
-              <a:t>8/16/2015</a:t>
+              <a:t>8/17/2015</a:t>
             </a:fld>
             <a:endParaRPr lang="en-US"/>
           </a:p>
@@ -6235,7 +6321,7 @@
           <a:p>
             <a:fld id="{C53C08D9-299C-46BC-8AE9-A81AD6C54D5C}" type="datetimeFigureOut">
               <a:rPr lang="en-US" smtClean="0"/>
-              <a:t>8/16/2015</a:t>
+              <a:t>8/17/2015</a:t>
             </a:fld>
             <a:endParaRPr lang="en-US"/>
           </a:p>
@@ -7649,6 +7735,47 @@
           <a:prstGeom prst="rect">
             <a:avLst/>
           </a:prstGeom>
+        </p:spPr>
+      </p:pic>
+      <p:pic>
+        <p:nvPicPr>
+          <p:cNvPr id="1026" name="Picture 2" descr="http://w5s.bnamericas.com/bnamericas/multimedia/12335.gif"/>
+          <p:cNvPicPr>
+            <a:picLocks noChangeAspect="1" noChangeArrowheads="1"/>
+          </p:cNvPicPr>
+          <p:nvPr/>
+        </p:nvPicPr>
+        <p:blipFill>
+          <a:blip r:embed="rId6">
+            <a:extLst>
+              <a:ext uri="{28A0092B-C50C-407E-A947-70E740481C1C}">
+                <a14:useLocalDpi xmlns:a14="http://schemas.microsoft.com/office/drawing/2010/main" val="0"/>
+              </a:ext>
+            </a:extLst>
+          </a:blip>
+          <a:srcRect/>
+          <a:stretch>
+            <a:fillRect/>
+          </a:stretch>
+        </p:blipFill>
+        <p:spPr bwMode="auto">
+          <a:xfrm>
+            <a:off x="5476543" y="5079003"/>
+            <a:ext cx="1428750" cy="1428750"/>
+          </a:xfrm>
+          <a:prstGeom prst="rect">
+            <a:avLst/>
+          </a:prstGeom>
+          <a:noFill/>
+          <a:extLst>
+            <a:ext uri="{909E8E84-426E-40DD-AFC4-6F175D3DCCD1}">
+              <a14:hiddenFill xmlns:a14="http://schemas.microsoft.com/office/drawing/2010/main">
+                <a:solidFill>
+                  <a:srgbClr val="FFFFFF"/>
+                </a:solidFill>
+              </a14:hiddenFill>
+            </a:ext>
+          </a:extLst>
         </p:spPr>
       </p:pic>
     </p:spTree>

</xml_diff>

<commit_message>
BAF power point edits
</commit_message>
<xml_diff>
--- a/2015_CLRS.pptx
+++ b/2015_CLRS.pptx
@@ -1183,22 +1183,22 @@
   </dgm:ptLst>
   <dgm:cxnLst>
     <dgm:cxn modelId="{E09019EA-4AE8-4B1B-A92A-262462CDD531}" srcId="{9C82F72C-C9C6-417E-94F3-FE4F163228B4}" destId="{FDC92FA5-E249-47D8-A68F-DC2F5EFC8FC0}" srcOrd="2" destOrd="0" parTransId="{E579882E-34E7-4E1F-9E49-8F3AB9BD97AE}" sibTransId="{7195C6A4-78EB-48F2-8CFF-D19F9E6846BD}"/>
-    <dgm:cxn modelId="{B29CC9E3-17E8-4630-AFC8-CC6A1F1BC675}" srcId="{9C82F72C-C9C6-417E-94F3-FE4F163228B4}" destId="{6359EC4B-25FF-401F-9B3C-32081811BE67}" srcOrd="1" destOrd="0" parTransId="{CC31E0AB-D334-4D09-9CB9-1053EB2A4225}" sibTransId="{B93848F4-E476-4CE6-8C46-3FB3B4815CC6}"/>
-    <dgm:cxn modelId="{70A324FE-03DB-4E6A-BED6-A31B72EC80DC}" type="presOf" srcId="{7A73708B-A80D-4D51-A78C-6A9967F47584}" destId="{3BBEBE08-BF62-4A70-9275-4D7FCF686FB0}" srcOrd="2" destOrd="0" presId="urn:microsoft.com/office/officeart/2005/8/layout/gear1"/>
-    <dgm:cxn modelId="{E5D89579-A757-41A9-B2F5-9E23CAD6CA20}" type="presOf" srcId="{7A73708B-A80D-4D51-A78C-6A9967F47584}" destId="{DCDA8B26-E4BB-4FFB-BF63-7D7BAD72F6CA}" srcOrd="1" destOrd="0" presId="urn:microsoft.com/office/officeart/2005/8/layout/gear1"/>
-    <dgm:cxn modelId="{18EFDD23-8C36-4C96-BBBD-45EB01021A01}" type="presOf" srcId="{B93848F4-E476-4CE6-8C46-3FB3B4815CC6}" destId="{B8609929-57CA-4F2D-92EC-DB686F09C98F}" srcOrd="0" destOrd="0" presId="urn:microsoft.com/office/officeart/2005/8/layout/gear1"/>
-    <dgm:cxn modelId="{D63B256B-A3EF-430B-B0E6-F82BDEFD9571}" type="presOf" srcId="{FDC92FA5-E249-47D8-A68F-DC2F5EFC8FC0}" destId="{80B7E18E-4168-4742-89F1-34D96C2E305A}" srcOrd="1" destOrd="0" presId="urn:microsoft.com/office/officeart/2005/8/layout/gear1"/>
-    <dgm:cxn modelId="{CEEBCA38-B6D6-42FF-9F29-6A5D67B9B73F}" type="presOf" srcId="{7195C6A4-78EB-48F2-8CFF-D19F9E6846BD}" destId="{A1D0E260-73D8-4E44-994B-6B4F3D3C63D9}" srcOrd="0" destOrd="0" presId="urn:microsoft.com/office/officeart/2005/8/layout/gear1"/>
-    <dgm:cxn modelId="{C2A994FD-4ED9-4C4B-8CAA-F4B362F97718}" type="presOf" srcId="{FDC92FA5-E249-47D8-A68F-DC2F5EFC8FC0}" destId="{6DCCBD9A-F0B4-4EB7-8DA6-2C09E9A9D47A}" srcOrd="2" destOrd="0" presId="urn:microsoft.com/office/officeart/2005/8/layout/gear1"/>
-    <dgm:cxn modelId="{92995297-52C4-448B-B237-4405FA7A098F}" type="presOf" srcId="{FDC92FA5-E249-47D8-A68F-DC2F5EFC8FC0}" destId="{AF00894D-C69B-4B56-B57D-7E9B3EF03F89}" srcOrd="0" destOrd="0" presId="urn:microsoft.com/office/officeart/2005/8/layout/gear1"/>
-    <dgm:cxn modelId="{DADD764D-A87F-4BED-922D-BE36FFF2FFAA}" type="presOf" srcId="{0362546E-DAC8-425C-9C7F-A88A95F12640}" destId="{F0F4C72F-0AD2-41A6-A52F-EE0874430483}" srcOrd="0" destOrd="0" presId="urn:microsoft.com/office/officeart/2005/8/layout/gear1"/>
     <dgm:cxn modelId="{4E56123C-2620-46B6-960D-C09B5D4B45C1}" type="presOf" srcId="{6359EC4B-25FF-401F-9B3C-32081811BE67}" destId="{1F8C19DA-2A82-423D-A129-C46CC12D3DBE}" srcOrd="2" destOrd="0" presId="urn:microsoft.com/office/officeart/2005/8/layout/gear1"/>
-    <dgm:cxn modelId="{265C03AC-C508-40AC-A67A-3868D019899A}" type="presOf" srcId="{FDC92FA5-E249-47D8-A68F-DC2F5EFC8FC0}" destId="{9CED87F8-F656-4477-8AE3-8D6E3BB27783}" srcOrd="3" destOrd="0" presId="urn:microsoft.com/office/officeart/2005/8/layout/gear1"/>
-    <dgm:cxn modelId="{11B6898C-6973-4DCA-99BA-F56799D90FD1}" srcId="{9C82F72C-C9C6-417E-94F3-FE4F163228B4}" destId="{7A73708B-A80D-4D51-A78C-6A9967F47584}" srcOrd="0" destOrd="0" parTransId="{5FC7D5F5-DFCB-4D7F-AE6B-24D04436EF31}" sibTransId="{0362546E-DAC8-425C-9C7F-A88A95F12640}"/>
     <dgm:cxn modelId="{80A4C92E-38E3-4699-A461-7EB13E455006}" type="presOf" srcId="{7A73708B-A80D-4D51-A78C-6A9967F47584}" destId="{3C5199D7-1D93-4271-9DF9-1AC674C1F187}" srcOrd="0" destOrd="0" presId="urn:microsoft.com/office/officeart/2005/8/layout/gear1"/>
-    <dgm:cxn modelId="{73B3FE0D-A83E-4B76-AD93-79C0E1F127BF}" type="presOf" srcId="{6359EC4B-25FF-401F-9B3C-32081811BE67}" destId="{D485BBE8-F8BF-41AD-914C-1C203D6E82FF}" srcOrd="0" destOrd="0" presId="urn:microsoft.com/office/officeart/2005/8/layout/gear1"/>
     <dgm:cxn modelId="{3BE2F872-421C-484A-B9EE-60226D47F56E}" type="presOf" srcId="{9C82F72C-C9C6-417E-94F3-FE4F163228B4}" destId="{FD78A960-2ACB-4115-9429-DAAA27AC092E}" srcOrd="0" destOrd="0" presId="urn:microsoft.com/office/officeart/2005/8/layout/gear1"/>
     <dgm:cxn modelId="{D04C0AB9-017E-40F0-B191-3E404D16DFC3}" type="presOf" srcId="{6359EC4B-25FF-401F-9B3C-32081811BE67}" destId="{3F6105AC-FE4C-4E28-880E-9E4158957B7D}" srcOrd="1" destOrd="0" presId="urn:microsoft.com/office/officeart/2005/8/layout/gear1"/>
+    <dgm:cxn modelId="{DADD764D-A87F-4BED-922D-BE36FFF2FFAA}" type="presOf" srcId="{0362546E-DAC8-425C-9C7F-A88A95F12640}" destId="{F0F4C72F-0AD2-41A6-A52F-EE0874430483}" srcOrd="0" destOrd="0" presId="urn:microsoft.com/office/officeart/2005/8/layout/gear1"/>
+    <dgm:cxn modelId="{18EFDD23-8C36-4C96-BBBD-45EB01021A01}" type="presOf" srcId="{B93848F4-E476-4CE6-8C46-3FB3B4815CC6}" destId="{B8609929-57CA-4F2D-92EC-DB686F09C98F}" srcOrd="0" destOrd="0" presId="urn:microsoft.com/office/officeart/2005/8/layout/gear1"/>
+    <dgm:cxn modelId="{B29CC9E3-17E8-4630-AFC8-CC6A1F1BC675}" srcId="{9C82F72C-C9C6-417E-94F3-FE4F163228B4}" destId="{6359EC4B-25FF-401F-9B3C-32081811BE67}" srcOrd="1" destOrd="0" parTransId="{CC31E0AB-D334-4D09-9CB9-1053EB2A4225}" sibTransId="{B93848F4-E476-4CE6-8C46-3FB3B4815CC6}"/>
+    <dgm:cxn modelId="{265C03AC-C508-40AC-A67A-3868D019899A}" type="presOf" srcId="{FDC92FA5-E249-47D8-A68F-DC2F5EFC8FC0}" destId="{9CED87F8-F656-4477-8AE3-8D6E3BB27783}" srcOrd="3" destOrd="0" presId="urn:microsoft.com/office/officeart/2005/8/layout/gear1"/>
+    <dgm:cxn modelId="{E5D89579-A757-41A9-B2F5-9E23CAD6CA20}" type="presOf" srcId="{7A73708B-A80D-4D51-A78C-6A9967F47584}" destId="{DCDA8B26-E4BB-4FFB-BF63-7D7BAD72F6CA}" srcOrd="1" destOrd="0" presId="urn:microsoft.com/office/officeart/2005/8/layout/gear1"/>
+    <dgm:cxn modelId="{CEEBCA38-B6D6-42FF-9F29-6A5D67B9B73F}" type="presOf" srcId="{7195C6A4-78EB-48F2-8CFF-D19F9E6846BD}" destId="{A1D0E260-73D8-4E44-994B-6B4F3D3C63D9}" srcOrd="0" destOrd="0" presId="urn:microsoft.com/office/officeart/2005/8/layout/gear1"/>
+    <dgm:cxn modelId="{D63B256B-A3EF-430B-B0E6-F82BDEFD9571}" type="presOf" srcId="{FDC92FA5-E249-47D8-A68F-DC2F5EFC8FC0}" destId="{80B7E18E-4168-4742-89F1-34D96C2E305A}" srcOrd="1" destOrd="0" presId="urn:microsoft.com/office/officeart/2005/8/layout/gear1"/>
+    <dgm:cxn modelId="{70A324FE-03DB-4E6A-BED6-A31B72EC80DC}" type="presOf" srcId="{7A73708B-A80D-4D51-A78C-6A9967F47584}" destId="{3BBEBE08-BF62-4A70-9275-4D7FCF686FB0}" srcOrd="2" destOrd="0" presId="urn:microsoft.com/office/officeart/2005/8/layout/gear1"/>
+    <dgm:cxn modelId="{C2A994FD-4ED9-4C4B-8CAA-F4B362F97718}" type="presOf" srcId="{FDC92FA5-E249-47D8-A68F-DC2F5EFC8FC0}" destId="{6DCCBD9A-F0B4-4EB7-8DA6-2C09E9A9D47A}" srcOrd="2" destOrd="0" presId="urn:microsoft.com/office/officeart/2005/8/layout/gear1"/>
+    <dgm:cxn modelId="{11B6898C-6973-4DCA-99BA-F56799D90FD1}" srcId="{9C82F72C-C9C6-417E-94F3-FE4F163228B4}" destId="{7A73708B-A80D-4D51-A78C-6A9967F47584}" srcOrd="0" destOrd="0" parTransId="{5FC7D5F5-DFCB-4D7F-AE6B-24D04436EF31}" sibTransId="{0362546E-DAC8-425C-9C7F-A88A95F12640}"/>
+    <dgm:cxn modelId="{73B3FE0D-A83E-4B76-AD93-79C0E1F127BF}" type="presOf" srcId="{6359EC4B-25FF-401F-9B3C-32081811BE67}" destId="{D485BBE8-F8BF-41AD-914C-1C203D6E82FF}" srcOrd="0" destOrd="0" presId="urn:microsoft.com/office/officeart/2005/8/layout/gear1"/>
+    <dgm:cxn modelId="{92995297-52C4-448B-B237-4405FA7A098F}" type="presOf" srcId="{FDC92FA5-E249-47D8-A68F-DC2F5EFC8FC0}" destId="{AF00894D-C69B-4B56-B57D-7E9B3EF03F89}" srcOrd="0" destOrd="0" presId="urn:microsoft.com/office/officeart/2005/8/layout/gear1"/>
     <dgm:cxn modelId="{276F6F67-9363-4E8A-A1E0-2DAE9AA6CE9D}" type="presParOf" srcId="{FD78A960-2ACB-4115-9429-DAAA27AC092E}" destId="{3C5199D7-1D93-4271-9DF9-1AC674C1F187}" srcOrd="0" destOrd="0" presId="urn:microsoft.com/office/officeart/2005/8/layout/gear1"/>
     <dgm:cxn modelId="{746C5298-38F9-4C0B-B23A-5D6296A2B472}" type="presParOf" srcId="{FD78A960-2ACB-4115-9429-DAAA27AC092E}" destId="{DCDA8B26-E4BB-4FFB-BF63-7D7BAD72F6CA}" srcOrd="1" destOrd="0" presId="urn:microsoft.com/office/officeart/2005/8/layout/gear1"/>
     <dgm:cxn modelId="{EEABE59E-97C9-4DAA-A43D-0A81CE943A15}" type="presParOf" srcId="{FD78A960-2ACB-4115-9429-DAAA27AC092E}" destId="{3BBEBE08-BF62-4A70-9275-4D7FCF686FB0}" srcOrd="2" destOrd="0" presId="urn:microsoft.com/office/officeart/2005/8/layout/gear1"/>
@@ -3202,7 +3202,7 @@
           <a:p>
             <a:fld id="{F6883597-B14F-4316-96C8-8EF59AEB1C81}" type="datetimeFigureOut">
               <a:rPr lang="en-US" smtClean="0"/>
-              <a:t>8/17/2015</a:t>
+              <a:t>8/19/2015</a:t>
             </a:fld>
             <a:endParaRPr lang="en-US"/>
           </a:p>
@@ -3541,11 +3541,7 @@
             </a:r>
             <a:r>
               <a:rPr lang="en-US" dirty="0" smtClean="0"/>
-              <a:t>. Goldman Sachs had </a:t>
-            </a:r>
-            <a:r>
-              <a:rPr lang="en-US" dirty="0" smtClean="0"/>
-              <a:t>estimated </a:t>
+              <a:t>. Goldman Sachs had estimated </a:t>
             </a:r>
             <a:r>
               <a:rPr lang="en-US" dirty="0" err="1" smtClean="0"/>
@@ -4000,7 +3996,7 @@
           <a:p>
             <a:fld id="{C53C08D9-299C-46BC-8AE9-A81AD6C54D5C}" type="datetimeFigureOut">
               <a:rPr lang="en-US" smtClean="0"/>
-              <a:t>8/17/2015</a:t>
+              <a:t>8/19/2015</a:t>
             </a:fld>
             <a:endParaRPr lang="en-US"/>
           </a:p>
@@ -4170,7 +4166,7 @@
           <a:p>
             <a:fld id="{C53C08D9-299C-46BC-8AE9-A81AD6C54D5C}" type="datetimeFigureOut">
               <a:rPr lang="en-US" smtClean="0"/>
-              <a:t>8/17/2015</a:t>
+              <a:t>8/19/2015</a:t>
             </a:fld>
             <a:endParaRPr lang="en-US"/>
           </a:p>
@@ -4350,7 +4346,7 @@
           <a:p>
             <a:fld id="{C53C08D9-299C-46BC-8AE9-A81AD6C54D5C}" type="datetimeFigureOut">
               <a:rPr lang="en-US" smtClean="0"/>
-              <a:t>8/17/2015</a:t>
+              <a:t>8/19/2015</a:t>
             </a:fld>
             <a:endParaRPr lang="en-US"/>
           </a:p>
@@ -4520,7 +4516,7 @@
           <a:p>
             <a:fld id="{C53C08D9-299C-46BC-8AE9-A81AD6C54D5C}" type="datetimeFigureOut">
               <a:rPr lang="en-US" smtClean="0"/>
-              <a:t>8/17/2015</a:t>
+              <a:t>8/19/2015</a:t>
             </a:fld>
             <a:endParaRPr lang="en-US"/>
           </a:p>
@@ -4766,7 +4762,7 @@
           <a:p>
             <a:fld id="{C53C08D9-299C-46BC-8AE9-A81AD6C54D5C}" type="datetimeFigureOut">
               <a:rPr lang="en-US" smtClean="0"/>
-              <a:t>8/17/2015</a:t>
+              <a:t>8/19/2015</a:t>
             </a:fld>
             <a:endParaRPr lang="en-US"/>
           </a:p>
@@ -4998,7 +4994,7 @@
           <a:p>
             <a:fld id="{C53C08D9-299C-46BC-8AE9-A81AD6C54D5C}" type="datetimeFigureOut">
               <a:rPr lang="en-US" smtClean="0"/>
-              <a:t>8/17/2015</a:t>
+              <a:t>8/19/2015</a:t>
             </a:fld>
             <a:endParaRPr lang="en-US"/>
           </a:p>
@@ -5365,7 +5361,7 @@
           <a:p>
             <a:fld id="{C53C08D9-299C-46BC-8AE9-A81AD6C54D5C}" type="datetimeFigureOut">
               <a:rPr lang="en-US" smtClean="0"/>
-              <a:t>8/17/2015</a:t>
+              <a:t>8/19/2015</a:t>
             </a:fld>
             <a:endParaRPr lang="en-US"/>
           </a:p>
@@ -5483,7 +5479,7 @@
           <a:p>
             <a:fld id="{C53C08D9-299C-46BC-8AE9-A81AD6C54D5C}" type="datetimeFigureOut">
               <a:rPr lang="en-US" smtClean="0"/>
-              <a:t>8/17/2015</a:t>
+              <a:t>8/19/2015</a:t>
             </a:fld>
             <a:endParaRPr lang="en-US"/>
           </a:p>
@@ -5578,7 +5574,7 @@
           <a:p>
             <a:fld id="{C53C08D9-299C-46BC-8AE9-A81AD6C54D5C}" type="datetimeFigureOut">
               <a:rPr lang="en-US" smtClean="0"/>
-              <a:t>8/17/2015</a:t>
+              <a:t>8/19/2015</a:t>
             </a:fld>
             <a:endParaRPr lang="en-US"/>
           </a:p>
@@ -5855,7 +5851,7 @@
           <a:p>
             <a:fld id="{C53C08D9-299C-46BC-8AE9-A81AD6C54D5C}" type="datetimeFigureOut">
               <a:rPr lang="en-US" smtClean="0"/>
-              <a:t>8/17/2015</a:t>
+              <a:t>8/19/2015</a:t>
             </a:fld>
             <a:endParaRPr lang="en-US"/>
           </a:p>
@@ -6108,7 +6104,7 @@
           <a:p>
             <a:fld id="{C53C08D9-299C-46BC-8AE9-A81AD6C54D5C}" type="datetimeFigureOut">
               <a:rPr lang="en-US" smtClean="0"/>
-              <a:t>8/17/2015</a:t>
+              <a:t>8/19/2015</a:t>
             </a:fld>
             <a:endParaRPr lang="en-US"/>
           </a:p>
@@ -6321,7 +6317,7 @@
           <a:p>
             <a:fld id="{C53C08D9-299C-46BC-8AE9-A81AD6C54D5C}" type="datetimeFigureOut">
               <a:rPr lang="en-US" smtClean="0"/>
-              <a:t>8/17/2015</a:t>
+              <a:t>8/19/2015</a:t>
             </a:fld>
             <a:endParaRPr lang="en-US"/>
           </a:p>
@@ -6992,7 +6988,7 @@
         <p:spPr>
           <a:xfrm>
             <a:off x="9086127" y="949124"/>
-            <a:ext cx="2662177" cy="923330"/>
+            <a:ext cx="2662177" cy="2062103"/>
           </a:xfrm>
           <a:prstGeom prst="rect">
             <a:avLst/>
@@ -7006,10 +7002,10 @@
           <a:lstStyle/>
           <a:p>
             <a:r>
-              <a:rPr lang="en-US" dirty="0" smtClean="0"/>
+              <a:rPr lang="en-US" sz="3200" dirty="0" smtClean="0"/>
               <a:t>Each step is likely repeated over and over again.</a:t>
             </a:r>
-            <a:endParaRPr lang="en-US" dirty="0"/>
+            <a:endParaRPr lang="en-US" sz="3200" dirty="0"/>
           </a:p>
         </p:txBody>
       </p:sp>
@@ -7174,6 +7170,13 @@
   <p:clrMapOvr>
     <a:masterClrMapping/>
   </p:clrMapOvr>
+  <p:timing>
+    <p:tnLst>
+      <p:par>
+        <p:cTn id="1" dur="indefinite" restart="never" nodeType="tmRoot"/>
+      </p:par>
+    </p:tnLst>
+  </p:timing>
 </p:sld>
 </file>
 
@@ -7264,6 +7267,13 @@
   <p:clrMapOvr>
     <a:masterClrMapping/>
   </p:clrMapOvr>
+  <p:timing>
+    <p:tnLst>
+      <p:par>
+        <p:cTn id="1" dur="indefinite" restart="never" nodeType="tmRoot"/>
+      </p:par>
+    </p:tnLst>
+  </p:timing>
 </p:sld>
 </file>
 
@@ -7319,43 +7329,45 @@
         </p:nvSpPr>
         <p:spPr/>
         <p:txBody>
-          <a:bodyPr/>
+          <a:bodyPr>
+            <a:noAutofit/>
+          </a:bodyPr>
           <a:lstStyle/>
           <a:p>
             <a:r>
-              <a:rPr lang="en-US" dirty="0" smtClean="0"/>
+              <a:rPr lang="en-US" sz="3200" dirty="0" smtClean="0"/>
               <a:t>R code and documentation are contained in a single document.</a:t>
             </a:r>
           </a:p>
           <a:p>
             <a:r>
-              <a:rPr lang="en-US" dirty="0" smtClean="0"/>
+              <a:rPr lang="en-US" sz="3200" dirty="0" smtClean="0"/>
               <a:t>Easy to use with </a:t>
             </a:r>
             <a:r>
-              <a:rPr lang="en-US" dirty="0" err="1" smtClean="0"/>
+              <a:rPr lang="en-US" sz="3200" dirty="0" err="1" smtClean="0"/>
               <a:t>git</a:t>
             </a:r>
             <a:r>
-              <a:rPr lang="en-US" dirty="0" smtClean="0"/>
+              <a:rPr lang="en-US" sz="3200" dirty="0" smtClean="0"/>
               <a:t>, particularly if you’re using R Studio.</a:t>
             </a:r>
           </a:p>
           <a:p>
             <a:r>
-              <a:rPr lang="en-US" dirty="0" smtClean="0"/>
+              <a:rPr lang="en-US" sz="3200" dirty="0" smtClean="0"/>
               <a:t>“Literate programming” means that the code exists alongside explanations of what’s going on.</a:t>
             </a:r>
           </a:p>
           <a:p>
             <a:r>
-              <a:rPr lang="en-US" dirty="0" smtClean="0"/>
+              <a:rPr lang="en-US" sz="3200" dirty="0" smtClean="0"/>
               <a:t>Visual output appears in the document automatically.</a:t>
             </a:r>
           </a:p>
           <a:p>
             <a:r>
-              <a:rPr lang="en-US" dirty="0" smtClean="0"/>
+              <a:rPr lang="en-US" sz="3200" dirty="0" smtClean="0"/>
               <a:t>Output to Word, PDF or HTML.</a:t>
             </a:r>
           </a:p>
@@ -8066,7 +8078,7 @@
           <a:p>
             <a:r>
               <a:rPr lang="en-US" dirty="0" smtClean="0"/>
-              <a:t>None of the results were accurate</a:t>
+              <a:t>All of the results contained material errors</a:t>
             </a:r>
             <a:endParaRPr lang="en-US" dirty="0"/>
           </a:p>
@@ -8223,50 +8235,50 @@
         </p:nvSpPr>
         <p:spPr/>
         <p:txBody>
-          <a:bodyPr/>
+          <a:bodyPr>
+            <a:normAutofit/>
+          </a:bodyPr>
           <a:lstStyle/>
           <a:p>
             <a:r>
-              <a:rPr lang="en-US" dirty="0" smtClean="0"/>
+              <a:rPr lang="en-US" sz="3600" dirty="0" smtClean="0"/>
               <a:t>Multiple iterations of data collection and analysis</a:t>
             </a:r>
           </a:p>
           <a:p>
             <a:r>
-              <a:rPr lang="en-US" dirty="0" smtClean="0"/>
+              <a:rPr lang="en-US" sz="3600" dirty="0" smtClean="0"/>
               <a:t>Movement of analysis and files across systems</a:t>
             </a:r>
           </a:p>
           <a:p>
             <a:r>
-              <a:rPr lang="en-US" dirty="0" smtClean="0"/>
+              <a:rPr lang="en-US" sz="3600" dirty="0" smtClean="0"/>
               <a:t>Collaboration</a:t>
             </a:r>
           </a:p>
           <a:p>
             <a:r>
-              <a:rPr lang="en-US" dirty="0" smtClean="0"/>
-              <a:t>Integration of results with</a:t>
-            </a:r>
-          </a:p>
-          <a:p>
-            <a:r>
-              <a:rPr lang="en-US" dirty="0" smtClean="0"/>
-              <a:t>Must be easily peer reviewed</a:t>
-            </a:r>
-          </a:p>
-          <a:p>
-            <a:r>
-              <a:rPr lang="en-US" dirty="0" smtClean="0"/>
+              <a:rPr lang="en-US" sz="3600" dirty="0" smtClean="0"/>
+              <a:t>Must </a:t>
+            </a:r>
+            <a:r>
+              <a:rPr lang="en-US" sz="3600" dirty="0" smtClean="0"/>
+              <a:t>be easily peer reviewed</a:t>
+            </a:r>
+          </a:p>
+          <a:p>
+            <a:r>
+              <a:rPr lang="en-US" sz="3600" dirty="0" smtClean="0"/>
               <a:t>High financial stakes</a:t>
             </a:r>
           </a:p>
           <a:p>
             <a:r>
-              <a:rPr lang="en-US" dirty="0" smtClean="0"/>
+              <a:rPr lang="en-US" sz="3600" dirty="0" smtClean="0"/>
               <a:t>Duty to the public</a:t>
             </a:r>
-            <a:endParaRPr lang="en-US" dirty="0"/>
+            <a:endParaRPr lang="en-US" sz="3600" dirty="0"/>
           </a:p>
         </p:txBody>
       </p:sp>
@@ -8283,9 +8295,329 @@
   <p:timing>
     <p:tnLst>
       <p:par>
-        <p:cTn id="1" dur="indefinite" restart="never" nodeType="tmRoot"/>
+        <p:cTn id="1" dur="indefinite" restart="never" nodeType="tmRoot">
+          <p:childTnLst>
+            <p:seq concurrent="1" nextAc="seek">
+              <p:cTn id="2" dur="indefinite" nodeType="mainSeq">
+                <p:childTnLst>
+                  <p:par>
+                    <p:cTn id="3" fill="hold">
+                      <p:stCondLst>
+                        <p:cond delay="indefinite"/>
+                      </p:stCondLst>
+                      <p:childTnLst>
+                        <p:par>
+                          <p:cTn id="4" fill="hold">
+                            <p:stCondLst>
+                              <p:cond delay="0"/>
+                            </p:stCondLst>
+                            <p:childTnLst>
+                              <p:par>
+                                <p:cTn id="5" presetID="1" presetClass="entr" presetSubtype="0" fill="hold" grpId="0" nodeType="clickEffect">
+                                  <p:stCondLst>
+                                    <p:cond delay="0"/>
+                                  </p:stCondLst>
+                                  <p:childTnLst>
+                                    <p:set>
+                                      <p:cBhvr>
+                                        <p:cTn id="6" dur="1" fill="hold">
+                                          <p:stCondLst>
+                                            <p:cond delay="0"/>
+                                          </p:stCondLst>
+                                        </p:cTn>
+                                        <p:tgtEl>
+                                          <p:spTgt spid="5">
+                                            <p:txEl>
+                                              <p:pRg st="0" end="0"/>
+                                            </p:txEl>
+                                          </p:spTgt>
+                                        </p:tgtEl>
+                                        <p:attrNameLst>
+                                          <p:attrName>style.visibility</p:attrName>
+                                        </p:attrNameLst>
+                                      </p:cBhvr>
+                                      <p:to>
+                                        <p:strVal val="visible"/>
+                                      </p:to>
+                                    </p:set>
+                                  </p:childTnLst>
+                                </p:cTn>
+                              </p:par>
+                            </p:childTnLst>
+                          </p:cTn>
+                        </p:par>
+                      </p:childTnLst>
+                    </p:cTn>
+                  </p:par>
+                  <p:par>
+                    <p:cTn id="7" fill="hold">
+                      <p:stCondLst>
+                        <p:cond delay="indefinite"/>
+                      </p:stCondLst>
+                      <p:childTnLst>
+                        <p:par>
+                          <p:cTn id="8" fill="hold">
+                            <p:stCondLst>
+                              <p:cond delay="0"/>
+                            </p:stCondLst>
+                            <p:childTnLst>
+                              <p:par>
+                                <p:cTn id="9" presetID="1" presetClass="entr" presetSubtype="0" fill="hold" grpId="0" nodeType="clickEffect">
+                                  <p:stCondLst>
+                                    <p:cond delay="0"/>
+                                  </p:stCondLst>
+                                  <p:childTnLst>
+                                    <p:set>
+                                      <p:cBhvr>
+                                        <p:cTn id="10" dur="1" fill="hold">
+                                          <p:stCondLst>
+                                            <p:cond delay="0"/>
+                                          </p:stCondLst>
+                                        </p:cTn>
+                                        <p:tgtEl>
+                                          <p:spTgt spid="5">
+                                            <p:txEl>
+                                              <p:pRg st="1" end="1"/>
+                                            </p:txEl>
+                                          </p:spTgt>
+                                        </p:tgtEl>
+                                        <p:attrNameLst>
+                                          <p:attrName>style.visibility</p:attrName>
+                                        </p:attrNameLst>
+                                      </p:cBhvr>
+                                      <p:to>
+                                        <p:strVal val="visible"/>
+                                      </p:to>
+                                    </p:set>
+                                  </p:childTnLst>
+                                </p:cTn>
+                              </p:par>
+                            </p:childTnLst>
+                          </p:cTn>
+                        </p:par>
+                      </p:childTnLst>
+                    </p:cTn>
+                  </p:par>
+                  <p:par>
+                    <p:cTn id="11" fill="hold">
+                      <p:stCondLst>
+                        <p:cond delay="indefinite"/>
+                      </p:stCondLst>
+                      <p:childTnLst>
+                        <p:par>
+                          <p:cTn id="12" fill="hold">
+                            <p:stCondLst>
+                              <p:cond delay="0"/>
+                            </p:stCondLst>
+                            <p:childTnLst>
+                              <p:par>
+                                <p:cTn id="13" presetID="1" presetClass="entr" presetSubtype="0" fill="hold" grpId="0" nodeType="clickEffect">
+                                  <p:stCondLst>
+                                    <p:cond delay="0"/>
+                                  </p:stCondLst>
+                                  <p:childTnLst>
+                                    <p:set>
+                                      <p:cBhvr>
+                                        <p:cTn id="14" dur="1" fill="hold">
+                                          <p:stCondLst>
+                                            <p:cond delay="0"/>
+                                          </p:stCondLst>
+                                        </p:cTn>
+                                        <p:tgtEl>
+                                          <p:spTgt spid="5">
+                                            <p:txEl>
+                                              <p:pRg st="2" end="2"/>
+                                            </p:txEl>
+                                          </p:spTgt>
+                                        </p:tgtEl>
+                                        <p:attrNameLst>
+                                          <p:attrName>style.visibility</p:attrName>
+                                        </p:attrNameLst>
+                                      </p:cBhvr>
+                                      <p:to>
+                                        <p:strVal val="visible"/>
+                                      </p:to>
+                                    </p:set>
+                                  </p:childTnLst>
+                                </p:cTn>
+                              </p:par>
+                            </p:childTnLst>
+                          </p:cTn>
+                        </p:par>
+                      </p:childTnLst>
+                    </p:cTn>
+                  </p:par>
+                  <p:par>
+                    <p:cTn id="15" fill="hold">
+                      <p:stCondLst>
+                        <p:cond delay="indefinite"/>
+                      </p:stCondLst>
+                      <p:childTnLst>
+                        <p:par>
+                          <p:cTn id="16" fill="hold">
+                            <p:stCondLst>
+                              <p:cond delay="0"/>
+                            </p:stCondLst>
+                            <p:childTnLst>
+                              <p:par>
+                                <p:cTn id="17" presetID="1" presetClass="entr" presetSubtype="0" fill="hold" grpId="0" nodeType="clickEffect">
+                                  <p:stCondLst>
+                                    <p:cond delay="0"/>
+                                  </p:stCondLst>
+                                  <p:childTnLst>
+                                    <p:set>
+                                      <p:cBhvr>
+                                        <p:cTn id="18" dur="1" fill="hold">
+                                          <p:stCondLst>
+                                            <p:cond delay="0"/>
+                                          </p:stCondLst>
+                                        </p:cTn>
+                                        <p:tgtEl>
+                                          <p:spTgt spid="5">
+                                            <p:txEl>
+                                              <p:pRg st="3" end="3"/>
+                                            </p:txEl>
+                                          </p:spTgt>
+                                        </p:tgtEl>
+                                        <p:attrNameLst>
+                                          <p:attrName>style.visibility</p:attrName>
+                                        </p:attrNameLst>
+                                      </p:cBhvr>
+                                      <p:to>
+                                        <p:strVal val="visible"/>
+                                      </p:to>
+                                    </p:set>
+                                  </p:childTnLst>
+                                </p:cTn>
+                              </p:par>
+                            </p:childTnLst>
+                          </p:cTn>
+                        </p:par>
+                      </p:childTnLst>
+                    </p:cTn>
+                  </p:par>
+                  <p:par>
+                    <p:cTn id="19" fill="hold">
+                      <p:stCondLst>
+                        <p:cond delay="indefinite"/>
+                      </p:stCondLst>
+                      <p:childTnLst>
+                        <p:par>
+                          <p:cTn id="20" fill="hold">
+                            <p:stCondLst>
+                              <p:cond delay="0"/>
+                            </p:stCondLst>
+                            <p:childTnLst>
+                              <p:par>
+                                <p:cTn id="21" presetID="1" presetClass="entr" presetSubtype="0" fill="hold" grpId="0" nodeType="clickEffect">
+                                  <p:stCondLst>
+                                    <p:cond delay="0"/>
+                                  </p:stCondLst>
+                                  <p:childTnLst>
+                                    <p:set>
+                                      <p:cBhvr>
+                                        <p:cTn id="22" dur="1" fill="hold">
+                                          <p:stCondLst>
+                                            <p:cond delay="0"/>
+                                          </p:stCondLst>
+                                        </p:cTn>
+                                        <p:tgtEl>
+                                          <p:spTgt spid="5">
+                                            <p:txEl>
+                                              <p:pRg st="4" end="4"/>
+                                            </p:txEl>
+                                          </p:spTgt>
+                                        </p:tgtEl>
+                                        <p:attrNameLst>
+                                          <p:attrName>style.visibility</p:attrName>
+                                        </p:attrNameLst>
+                                      </p:cBhvr>
+                                      <p:to>
+                                        <p:strVal val="visible"/>
+                                      </p:to>
+                                    </p:set>
+                                  </p:childTnLst>
+                                </p:cTn>
+                              </p:par>
+                            </p:childTnLst>
+                          </p:cTn>
+                        </p:par>
+                      </p:childTnLst>
+                    </p:cTn>
+                  </p:par>
+                  <p:par>
+                    <p:cTn id="23" fill="hold">
+                      <p:stCondLst>
+                        <p:cond delay="indefinite"/>
+                      </p:stCondLst>
+                      <p:childTnLst>
+                        <p:par>
+                          <p:cTn id="24" fill="hold">
+                            <p:stCondLst>
+                              <p:cond delay="0"/>
+                            </p:stCondLst>
+                            <p:childTnLst>
+                              <p:par>
+                                <p:cTn id="25" presetID="1" presetClass="entr" presetSubtype="0" fill="hold" grpId="0" nodeType="clickEffect">
+                                  <p:stCondLst>
+                                    <p:cond delay="0"/>
+                                  </p:stCondLst>
+                                  <p:childTnLst>
+                                    <p:set>
+                                      <p:cBhvr>
+                                        <p:cTn id="26" dur="1" fill="hold">
+                                          <p:stCondLst>
+                                            <p:cond delay="0"/>
+                                          </p:stCondLst>
+                                        </p:cTn>
+                                        <p:tgtEl>
+                                          <p:spTgt spid="5">
+                                            <p:txEl>
+                                              <p:pRg st="5" end="5"/>
+                                            </p:txEl>
+                                          </p:spTgt>
+                                        </p:tgtEl>
+                                        <p:attrNameLst>
+                                          <p:attrName>style.visibility</p:attrName>
+                                        </p:attrNameLst>
+                                      </p:cBhvr>
+                                      <p:to>
+                                        <p:strVal val="visible"/>
+                                      </p:to>
+                                    </p:set>
+                                  </p:childTnLst>
+                                </p:cTn>
+                              </p:par>
+                            </p:childTnLst>
+                          </p:cTn>
+                        </p:par>
+                      </p:childTnLst>
+                    </p:cTn>
+                  </p:par>
+                </p:childTnLst>
+              </p:cTn>
+              <p:prevCondLst>
+                <p:cond evt="onPrev" delay="0">
+                  <p:tgtEl>
+                    <p:sldTgt/>
+                  </p:tgtEl>
+                </p:cond>
+              </p:prevCondLst>
+              <p:nextCondLst>
+                <p:cond evt="onNext" delay="0">
+                  <p:tgtEl>
+                    <p:sldTgt/>
+                  </p:tgtEl>
+                </p:cond>
+              </p:nextCondLst>
+            </p:seq>
+          </p:childTnLst>
+        </p:cTn>
       </p:par>
     </p:tnLst>
+    <p:bldLst>
+      <p:bldP spid="5" grpId="0" uiExpand="1" build="p"/>
+    </p:bldLst>
   </p:timing>
 </p:sld>
 </file>
@@ -8411,20 +8743,38 @@
       </p:sp>
       <p:sp>
         <p:nvSpPr>
-          <p:cNvPr id="5" name="Text Placeholder 4"/>
-          <p:cNvSpPr>
-            <a:spLocks noGrp="1"/>
-          </p:cNvSpPr>
-          <p:nvPr>
-            <p:ph type="body" idx="1"/>
+          <p:cNvPr id="2" name="Content Placeholder 1"/>
+          <p:cNvSpPr>
+            <a:spLocks noGrp="1"/>
+          </p:cNvSpPr>
+          <p:nvPr>
+            <p:ph idx="1"/>
           </p:nvPr>
         </p:nvSpPr>
         <p:spPr/>
         <p:txBody>
-          <a:bodyPr/>
+          <a:bodyPr>
+            <a:normAutofit/>
+          </a:bodyPr>
           <a:lstStyle/>
           <a:p>
-            <a:endParaRPr lang="en-US"/>
+            <a:r>
+              <a:rPr lang="en-US" sz="3600" dirty="0" smtClean="0"/>
+              <a:t>Sarbanes/Oxley</a:t>
+            </a:r>
+          </a:p>
+          <a:p>
+            <a:r>
+              <a:rPr lang="en-US" sz="3600" dirty="0" smtClean="0"/>
+              <a:t>Solvency II/ORSA</a:t>
+            </a:r>
+          </a:p>
+          <a:p>
+            <a:r>
+              <a:rPr lang="en-US" sz="3600" dirty="0" smtClean="0"/>
+              <a:t>Actuarial Standards of Practice</a:t>
+            </a:r>
+            <a:endParaRPr lang="en-US" sz="3600" dirty="0"/>
           </a:p>
         </p:txBody>
       </p:sp>
@@ -8627,26 +8977,28 @@
         </p:nvSpPr>
         <p:spPr/>
         <p:txBody>
-          <a:bodyPr/>
+          <a:bodyPr>
+            <a:normAutofit/>
+          </a:bodyPr>
           <a:lstStyle/>
           <a:p>
             <a:r>
-              <a:rPr lang="en-US" dirty="0" smtClean="0"/>
+              <a:rPr lang="en-US" sz="4000" dirty="0" smtClean="0"/>
               <a:t>Collaboration</a:t>
             </a:r>
           </a:p>
           <a:p>
             <a:r>
-              <a:rPr lang="en-US" dirty="0" smtClean="0"/>
+              <a:rPr lang="en-US" sz="4000" dirty="0" smtClean="0"/>
               <a:t>Easy to move whole sets of files</a:t>
             </a:r>
           </a:p>
           <a:p>
             <a:r>
-              <a:rPr lang="en-US" dirty="0" smtClean="0"/>
+              <a:rPr lang="en-US" sz="4000" dirty="0" smtClean="0"/>
               <a:t>Track changes in a secure way</a:t>
             </a:r>
-            <a:endParaRPr lang="en-US" dirty="0"/>
+            <a:endParaRPr lang="en-US" sz="4000" dirty="0"/>
           </a:p>
         </p:txBody>
       </p:sp>

</xml_diff>

<commit_message>
Belated commit of final changes for presentation in Atlanta
</commit_message>
<xml_diff>
--- a/2015_CLRS.pptx
+++ b/2015_CLRS.pptx
@@ -7,6 +7,9 @@
   <p:notesMasterIdLst>
     <p:notesMasterId r:id="rId21"/>
   </p:notesMasterIdLst>
+  <p:handoutMasterIdLst>
+    <p:handoutMasterId r:id="rId22"/>
+  </p:handoutMasterIdLst>
   <p:sldIdLst>
     <p:sldId id="256" r:id="rId2"/>
     <p:sldId id="257" r:id="rId3"/>
@@ -29,7 +32,7 @@
     <p:sldId id="273" r:id="rId20"/>
   </p:sldIdLst>
   <p:sldSz cx="12192000" cy="6858000"/>
-  <p:notesSz cx="6858000" cy="9144000"/>
+  <p:notesSz cx="7010400" cy="9296400"/>
   <p:defaultTextStyle>
     <a:defPPr>
       <a:defRPr lang="en-US"/>
@@ -1231,384 +1234,6 @@
       <dsp:cNvGrpSpPr/>
     </dsp:nvGrpSpPr>
     <dsp:grpSpPr/>
-    <dsp:sp modelId="{3C5199D7-1D93-4271-9DF9-1AC674C1F187}">
-      <dsp:nvSpPr>
-        <dsp:cNvPr id="0" name=""/>
-        <dsp:cNvSpPr/>
-      </dsp:nvSpPr>
-      <dsp:spPr>
-        <a:xfrm>
-          <a:off x="3922371" y="3086100"/>
-          <a:ext cx="3771900" cy="3771900"/>
-        </a:xfrm>
-        <a:prstGeom prst="gear9">
-          <a:avLst/>
-        </a:prstGeom>
-        <a:solidFill>
-          <a:schemeClr val="accent1">
-            <a:hueOff val="0"/>
-            <a:satOff val="0"/>
-            <a:lumOff val="0"/>
-            <a:alphaOff val="0"/>
-          </a:schemeClr>
-        </a:solidFill>
-        <a:ln w="12700" cap="flat" cmpd="sng" algn="ctr">
-          <a:solidFill>
-            <a:schemeClr val="lt1">
-              <a:hueOff val="0"/>
-              <a:satOff val="0"/>
-              <a:lumOff val="0"/>
-              <a:alphaOff val="0"/>
-            </a:schemeClr>
-          </a:solidFill>
-          <a:prstDash val="solid"/>
-          <a:miter lim="800000"/>
-        </a:ln>
-        <a:effectLst/>
-      </dsp:spPr>
-      <dsp:style>
-        <a:lnRef idx="2">
-          <a:scrgbClr r="0" g="0" b="0"/>
-        </a:lnRef>
-        <a:fillRef idx="1">
-          <a:scrgbClr r="0" g="0" b="0"/>
-        </a:fillRef>
-        <a:effectRef idx="0">
-          <a:scrgbClr r="0" g="0" b="0"/>
-        </a:effectRef>
-        <a:fontRef idx="minor">
-          <a:schemeClr val="lt1"/>
-        </a:fontRef>
-      </dsp:style>
-      <dsp:txBody>
-        <a:bodyPr spcFirstLastPara="0" vert="horz" wrap="square" lIns="27940" tIns="27940" rIns="27940" bIns="27940" numCol="1" spcCol="1270" anchor="ctr" anchorCtr="0">
-          <a:noAutofit/>
-        </a:bodyPr>
-        <a:lstStyle/>
-        <a:p>
-          <a:pPr lvl="0" algn="ctr" defTabSz="977900">
-            <a:lnSpc>
-              <a:spcPct val="90000"/>
-            </a:lnSpc>
-            <a:spcBef>
-              <a:spcPct val="0"/>
-            </a:spcBef>
-            <a:spcAft>
-              <a:spcPct val="35000"/>
-            </a:spcAft>
-          </a:pPr>
-          <a:r>
-            <a:rPr lang="en-US" sz="2200" kern="1200" dirty="0" smtClean="0"/>
-            <a:t>Document results</a:t>
-          </a:r>
-          <a:endParaRPr lang="en-US" sz="2200" kern="1200" dirty="0"/>
-        </a:p>
-      </dsp:txBody>
-      <dsp:txXfrm>
-        <a:off x="4680691" y="3969650"/>
-        <a:ext cx="2255260" cy="1938834"/>
-      </dsp:txXfrm>
-    </dsp:sp>
-    <dsp:sp modelId="{D485BBE8-F8BF-41AD-914C-1C203D6E82FF}">
-      <dsp:nvSpPr>
-        <dsp:cNvPr id="0" name=""/>
-        <dsp:cNvSpPr/>
-      </dsp:nvSpPr>
-      <dsp:spPr>
-        <a:xfrm>
-          <a:off x="1727811" y="2194560"/>
-          <a:ext cx="2743200" cy="2743200"/>
-        </a:xfrm>
-        <a:prstGeom prst="gear6">
-          <a:avLst/>
-        </a:prstGeom>
-        <a:solidFill>
-          <a:schemeClr val="accent1">
-            <a:hueOff val="0"/>
-            <a:satOff val="0"/>
-            <a:lumOff val="0"/>
-            <a:alphaOff val="0"/>
-          </a:schemeClr>
-        </a:solidFill>
-        <a:ln w="12700" cap="flat" cmpd="sng" algn="ctr">
-          <a:solidFill>
-            <a:schemeClr val="lt1">
-              <a:hueOff val="0"/>
-              <a:satOff val="0"/>
-              <a:lumOff val="0"/>
-              <a:alphaOff val="0"/>
-            </a:schemeClr>
-          </a:solidFill>
-          <a:prstDash val="solid"/>
-          <a:miter lim="800000"/>
-        </a:ln>
-        <a:effectLst/>
-      </dsp:spPr>
-      <dsp:style>
-        <a:lnRef idx="2">
-          <a:scrgbClr r="0" g="0" b="0"/>
-        </a:lnRef>
-        <a:fillRef idx="1">
-          <a:scrgbClr r="0" g="0" b="0"/>
-        </a:fillRef>
-        <a:effectRef idx="0">
-          <a:scrgbClr r="0" g="0" b="0"/>
-        </a:effectRef>
-        <a:fontRef idx="minor">
-          <a:schemeClr val="lt1"/>
-        </a:fontRef>
-      </dsp:style>
-      <dsp:txBody>
-        <a:bodyPr spcFirstLastPara="0" vert="horz" wrap="square" lIns="27940" tIns="27940" rIns="27940" bIns="27940" numCol="1" spcCol="1270" anchor="ctr" anchorCtr="0">
-          <a:noAutofit/>
-        </a:bodyPr>
-        <a:lstStyle/>
-        <a:p>
-          <a:pPr lvl="0" algn="ctr" defTabSz="977900">
-            <a:lnSpc>
-              <a:spcPct val="90000"/>
-            </a:lnSpc>
-            <a:spcBef>
-              <a:spcPct val="0"/>
-            </a:spcBef>
-            <a:spcAft>
-              <a:spcPct val="35000"/>
-            </a:spcAft>
-          </a:pPr>
-          <a:r>
-            <a:rPr lang="en-US" sz="2200" kern="1200" dirty="0" smtClean="0"/>
-            <a:t>Analyze data</a:t>
-          </a:r>
-          <a:endParaRPr lang="en-US" sz="2200" kern="1200" dirty="0"/>
-        </a:p>
-      </dsp:txBody>
-      <dsp:txXfrm>
-        <a:off x="2418420" y="2889343"/>
-        <a:ext cx="1361982" cy="1353634"/>
-      </dsp:txXfrm>
-    </dsp:sp>
-    <dsp:sp modelId="{AF00894D-C69B-4B56-B57D-7E9B3EF03F89}">
-      <dsp:nvSpPr>
-        <dsp:cNvPr id="0" name=""/>
-        <dsp:cNvSpPr/>
-      </dsp:nvSpPr>
-      <dsp:spPr>
-        <a:xfrm rot="20700000">
-          <a:off x="3264282" y="302031"/>
-          <a:ext cx="2687776" cy="2687776"/>
-        </a:xfrm>
-        <a:prstGeom prst="gear6">
-          <a:avLst/>
-        </a:prstGeom>
-        <a:solidFill>
-          <a:schemeClr val="accent1">
-            <a:hueOff val="0"/>
-            <a:satOff val="0"/>
-            <a:lumOff val="0"/>
-            <a:alphaOff val="0"/>
-          </a:schemeClr>
-        </a:solidFill>
-        <a:ln w="12700" cap="flat" cmpd="sng" algn="ctr">
-          <a:solidFill>
-            <a:schemeClr val="lt1">
-              <a:hueOff val="0"/>
-              <a:satOff val="0"/>
-              <a:lumOff val="0"/>
-              <a:alphaOff val="0"/>
-            </a:schemeClr>
-          </a:solidFill>
-          <a:prstDash val="solid"/>
-          <a:miter lim="800000"/>
-        </a:ln>
-        <a:effectLst/>
-      </dsp:spPr>
-      <dsp:style>
-        <a:lnRef idx="2">
-          <a:scrgbClr r="0" g="0" b="0"/>
-        </a:lnRef>
-        <a:fillRef idx="1">
-          <a:scrgbClr r="0" g="0" b="0"/>
-        </a:fillRef>
-        <a:effectRef idx="0">
-          <a:scrgbClr r="0" g="0" b="0"/>
-        </a:effectRef>
-        <a:fontRef idx="minor">
-          <a:schemeClr val="lt1"/>
-        </a:fontRef>
-      </dsp:style>
-      <dsp:txBody>
-        <a:bodyPr spcFirstLastPara="0" vert="horz" wrap="square" lIns="27940" tIns="27940" rIns="27940" bIns="27940" numCol="1" spcCol="1270" anchor="ctr" anchorCtr="0">
-          <a:noAutofit/>
-        </a:bodyPr>
-        <a:lstStyle/>
-        <a:p>
-          <a:pPr lvl="0" algn="ctr" defTabSz="977900">
-            <a:lnSpc>
-              <a:spcPct val="90000"/>
-            </a:lnSpc>
-            <a:spcBef>
-              <a:spcPct val="0"/>
-            </a:spcBef>
-            <a:spcAft>
-              <a:spcPct val="35000"/>
-            </a:spcAft>
-          </a:pPr>
-          <a:r>
-            <a:rPr lang="en-US" sz="2200" kern="1200" smtClean="0"/>
-            <a:t>Fetch data and paste into spreadsheet</a:t>
-          </a:r>
-          <a:endParaRPr lang="en-US" sz="2200" kern="1200" dirty="0"/>
-        </a:p>
-      </dsp:txBody>
-      <dsp:txXfrm rot="-20700000">
-        <a:off x="3853791" y="891540"/>
-        <a:ext cx="1508760" cy="1508760"/>
-      </dsp:txXfrm>
-    </dsp:sp>
-    <dsp:sp modelId="{F0F4C72F-0AD2-41A6-A52F-EE0874430483}">
-      <dsp:nvSpPr>
-        <dsp:cNvPr id="0" name=""/>
-        <dsp:cNvSpPr/>
-      </dsp:nvSpPr>
-      <dsp:spPr>
-        <a:xfrm>
-          <a:off x="3662531" y="2499588"/>
-          <a:ext cx="4828032" cy="4828032"/>
-        </a:xfrm>
-        <a:prstGeom prst="circularArrow">
-          <a:avLst>
-            <a:gd name="adj1" fmla="val 4687"/>
-            <a:gd name="adj2" fmla="val 299029"/>
-            <a:gd name="adj3" fmla="val 2556741"/>
-            <a:gd name="adj4" fmla="val 15776484"/>
-            <a:gd name="adj5" fmla="val 5469"/>
-          </a:avLst>
-        </a:prstGeom>
-        <a:solidFill>
-          <a:schemeClr val="accent1">
-            <a:tint val="60000"/>
-            <a:hueOff val="0"/>
-            <a:satOff val="0"/>
-            <a:lumOff val="0"/>
-            <a:alphaOff val="0"/>
-          </a:schemeClr>
-        </a:solidFill>
-        <a:ln>
-          <a:noFill/>
-        </a:ln>
-        <a:effectLst/>
-      </dsp:spPr>
-      <dsp:style>
-        <a:lnRef idx="0">
-          <a:scrgbClr r="0" g="0" b="0"/>
-        </a:lnRef>
-        <a:fillRef idx="1">
-          <a:scrgbClr r="0" g="0" b="0"/>
-        </a:fillRef>
-        <a:effectRef idx="0">
-          <a:scrgbClr r="0" g="0" b="0"/>
-        </a:effectRef>
-        <a:fontRef idx="minor">
-          <a:schemeClr val="lt1"/>
-        </a:fontRef>
-      </dsp:style>
-    </dsp:sp>
-    <dsp:sp modelId="{B8609929-57CA-4F2D-92EC-DB686F09C98F}">
-      <dsp:nvSpPr>
-        <dsp:cNvPr id="0" name=""/>
-        <dsp:cNvSpPr/>
-      </dsp:nvSpPr>
-      <dsp:spPr>
-        <a:xfrm>
-          <a:off x="1241995" y="1576162"/>
-          <a:ext cx="3507867" cy="3507867"/>
-        </a:xfrm>
-        <a:prstGeom prst="leftCircularArrow">
-          <a:avLst>
-            <a:gd name="adj1" fmla="val 6452"/>
-            <a:gd name="adj2" fmla="val 429999"/>
-            <a:gd name="adj3" fmla="val 10489124"/>
-            <a:gd name="adj4" fmla="val 14837806"/>
-            <a:gd name="adj5" fmla="val 7527"/>
-          </a:avLst>
-        </a:prstGeom>
-        <a:solidFill>
-          <a:schemeClr val="accent1">
-            <a:tint val="60000"/>
-            <a:hueOff val="0"/>
-            <a:satOff val="0"/>
-            <a:lumOff val="0"/>
-            <a:alphaOff val="0"/>
-          </a:schemeClr>
-        </a:solidFill>
-        <a:ln>
-          <a:noFill/>
-        </a:ln>
-        <a:effectLst/>
-      </dsp:spPr>
-      <dsp:style>
-        <a:lnRef idx="0">
-          <a:scrgbClr r="0" g="0" b="0"/>
-        </a:lnRef>
-        <a:fillRef idx="1">
-          <a:scrgbClr r="0" g="0" b="0"/>
-        </a:fillRef>
-        <a:effectRef idx="0">
-          <a:scrgbClr r="0" g="0" b="0"/>
-        </a:effectRef>
-        <a:fontRef idx="minor">
-          <a:schemeClr val="lt1"/>
-        </a:fontRef>
-      </dsp:style>
-    </dsp:sp>
-    <dsp:sp modelId="{A1D0E260-73D8-4E44-994B-6B4F3D3C63D9}">
-      <dsp:nvSpPr>
-        <dsp:cNvPr id="0" name=""/>
-        <dsp:cNvSpPr/>
-      </dsp:nvSpPr>
-      <dsp:spPr>
-        <a:xfrm>
-          <a:off x="2642572" y="-298123"/>
-          <a:ext cx="3782187" cy="3782187"/>
-        </a:xfrm>
-        <a:prstGeom prst="circularArrow">
-          <a:avLst>
-            <a:gd name="adj1" fmla="val 5984"/>
-            <a:gd name="adj2" fmla="val 394124"/>
-            <a:gd name="adj3" fmla="val 13313824"/>
-            <a:gd name="adj4" fmla="val 10508221"/>
-            <a:gd name="adj5" fmla="val 6981"/>
-          </a:avLst>
-        </a:prstGeom>
-        <a:solidFill>
-          <a:schemeClr val="accent1">
-            <a:tint val="60000"/>
-            <a:hueOff val="0"/>
-            <a:satOff val="0"/>
-            <a:lumOff val="0"/>
-            <a:alphaOff val="0"/>
-          </a:schemeClr>
-        </a:solidFill>
-        <a:ln>
-          <a:noFill/>
-        </a:ln>
-        <a:effectLst/>
-      </dsp:spPr>
-      <dsp:style>
-        <a:lnRef idx="0">
-          <a:scrgbClr r="0" g="0" b="0"/>
-        </a:lnRef>
-        <a:fillRef idx="1">
-          <a:scrgbClr r="0" g="0" b="0"/>
-        </a:fillRef>
-        <a:effectRef idx="0">
-          <a:scrgbClr r="0" g="0" b="0"/>
-        </a:effectRef>
-        <a:fontRef idx="minor">
-          <a:schemeClr val="lt1"/>
-        </a:fontRef>
-      </dsp:style>
-    </dsp:sp>
   </dsp:spTree>
 </dsp:drawing>
 </file>
@@ -3120,6 +2745,171 @@
 </dgm:styleDef>
 </file>
 
+<file path=ppt/handoutMasters/handoutMaster1.xml><?xml version="1.0" encoding="utf-8"?>
+<p:handoutMaster xmlns:a="http://schemas.openxmlformats.org/drawingml/2006/main" xmlns:r="http://schemas.openxmlformats.org/officeDocument/2006/relationships" xmlns:p="http://schemas.openxmlformats.org/presentationml/2006/main">
+  <p:cSld>
+    <p:bg>
+      <p:bgRef idx="1001">
+        <a:schemeClr val="bg1"/>
+      </p:bgRef>
+    </p:bg>
+    <p:spTree>
+      <p:nvGrpSpPr>
+        <p:cNvPr id="1" name=""/>
+        <p:cNvGrpSpPr/>
+        <p:nvPr/>
+      </p:nvGrpSpPr>
+      <p:grpSpPr>
+        <a:xfrm>
+          <a:off x="0" y="0"/>
+          <a:ext cx="0" cy="0"/>
+          <a:chOff x="0" y="0"/>
+          <a:chExt cx="0" cy="0"/>
+        </a:xfrm>
+      </p:grpSpPr>
+      <p:sp>
+        <p:nvSpPr>
+          <p:cNvPr id="2" name="Header Placeholder 1"/>
+          <p:cNvSpPr>
+            <a:spLocks noGrp="1"/>
+          </p:cNvSpPr>
+          <p:nvPr>
+            <p:ph type="hdr" sz="quarter"/>
+          </p:nvPr>
+        </p:nvSpPr>
+        <p:spPr>
+          <a:xfrm>
+            <a:off x="1" y="0"/>
+            <a:ext cx="3037146" cy="466337"/>
+          </a:xfrm>
+          <a:prstGeom prst="rect">
+            <a:avLst/>
+          </a:prstGeom>
+        </p:spPr>
+        <p:txBody>
+          <a:bodyPr vert="horz" lIns="92060" tIns="46029" rIns="92060" bIns="46029" rtlCol="0"/>
+          <a:lstStyle>
+            <a:lvl1pPr algn="l">
+              <a:defRPr sz="1200"/>
+            </a:lvl1pPr>
+          </a:lstStyle>
+          <a:p>
+            <a:endParaRPr lang="en-US"/>
+          </a:p>
+        </p:txBody>
+      </p:sp>
+      <p:sp>
+        <p:nvSpPr>
+          <p:cNvPr id="3" name="Date Placeholder 2"/>
+          <p:cNvSpPr>
+            <a:spLocks noGrp="1"/>
+          </p:cNvSpPr>
+          <p:nvPr>
+            <p:ph type="dt" sz="quarter" idx="1"/>
+          </p:nvPr>
+        </p:nvSpPr>
+        <p:spPr>
+          <a:xfrm>
+            <a:off x="3971654" y="0"/>
+            <a:ext cx="3037146" cy="466337"/>
+          </a:xfrm>
+          <a:prstGeom prst="rect">
+            <a:avLst/>
+          </a:prstGeom>
+        </p:spPr>
+        <p:txBody>
+          <a:bodyPr vert="horz" lIns="92060" tIns="46029" rIns="92060" bIns="46029" rtlCol="0"/>
+          <a:lstStyle>
+            <a:lvl1pPr algn="r">
+              <a:defRPr sz="1200"/>
+            </a:lvl1pPr>
+          </a:lstStyle>
+          <a:p>
+            <a:fld id="{E5EB72B4-580B-45DC-973D-7C69D1191380}" type="datetimeFigureOut">
+              <a:rPr lang="en-US" smtClean="0"/>
+              <a:t>9/9/2015</a:t>
+            </a:fld>
+            <a:endParaRPr lang="en-US"/>
+          </a:p>
+        </p:txBody>
+      </p:sp>
+      <p:sp>
+        <p:nvSpPr>
+          <p:cNvPr id="4" name="Footer Placeholder 3"/>
+          <p:cNvSpPr>
+            <a:spLocks noGrp="1"/>
+          </p:cNvSpPr>
+          <p:nvPr>
+            <p:ph type="ftr" sz="quarter" idx="2"/>
+          </p:nvPr>
+        </p:nvSpPr>
+        <p:spPr>
+          <a:xfrm>
+            <a:off x="1" y="8830063"/>
+            <a:ext cx="3037146" cy="466337"/>
+          </a:xfrm>
+          <a:prstGeom prst="rect">
+            <a:avLst/>
+          </a:prstGeom>
+        </p:spPr>
+        <p:txBody>
+          <a:bodyPr vert="horz" lIns="92060" tIns="46029" rIns="92060" bIns="46029" rtlCol="0" anchor="b"/>
+          <a:lstStyle>
+            <a:lvl1pPr algn="l">
+              <a:defRPr sz="1200"/>
+            </a:lvl1pPr>
+          </a:lstStyle>
+          <a:p>
+            <a:endParaRPr lang="en-US"/>
+          </a:p>
+        </p:txBody>
+      </p:sp>
+      <p:sp>
+        <p:nvSpPr>
+          <p:cNvPr id="5" name="Slide Number Placeholder 4"/>
+          <p:cNvSpPr>
+            <a:spLocks noGrp="1"/>
+          </p:cNvSpPr>
+          <p:nvPr>
+            <p:ph type="sldNum" sz="quarter" idx="3"/>
+          </p:nvPr>
+        </p:nvSpPr>
+        <p:spPr>
+          <a:xfrm>
+            <a:off x="3971654" y="8830063"/>
+            <a:ext cx="3037146" cy="466337"/>
+          </a:xfrm>
+          <a:prstGeom prst="rect">
+            <a:avLst/>
+          </a:prstGeom>
+        </p:spPr>
+        <p:txBody>
+          <a:bodyPr vert="horz" lIns="92060" tIns="46029" rIns="92060" bIns="46029" rtlCol="0" anchor="b"/>
+          <a:lstStyle>
+            <a:lvl1pPr algn="r">
+              <a:defRPr sz="1200"/>
+            </a:lvl1pPr>
+          </a:lstStyle>
+          <a:p>
+            <a:fld id="{6DEEA710-4AC0-45C0-9E50-8FED5FC7B69B}" type="slidenum">
+              <a:rPr lang="en-US" smtClean="0"/>
+              <a:t>‹#›</a:t>
+            </a:fld>
+            <a:endParaRPr lang="en-US"/>
+          </a:p>
+        </p:txBody>
+      </p:sp>
+    </p:spTree>
+    <p:extLst>
+      <p:ext uri="{BB962C8B-B14F-4D97-AF65-F5344CB8AC3E}">
+        <p14:creationId xmlns:p14="http://schemas.microsoft.com/office/powerpoint/2010/main" val="1585077448"/>
+      </p:ext>
+    </p:extLst>
+  </p:cSld>
+  <p:clrMap bg1="lt1" tx1="dk1" bg2="lt2" tx2="dk2" accent1="accent1" accent2="accent2" accent3="accent3" accent4="accent4" accent5="accent5" accent6="accent6" hlink="hlink" folHlink="folHlink"/>
+</p:handoutMaster>
+</file>
+
 <file path=ppt/notesMasters/notesMaster1.xml><?xml version="1.0" encoding="utf-8"?>
 <p:notesMaster xmlns:a="http://schemas.openxmlformats.org/drawingml/2006/main" xmlns:r="http://schemas.openxmlformats.org/officeDocument/2006/relationships" xmlns:p="http://schemas.openxmlformats.org/presentationml/2006/main">
   <p:cSld>
@@ -3154,15 +2944,15 @@
         </p:nvSpPr>
         <p:spPr>
           <a:xfrm>
-            <a:off x="0" y="0"/>
-            <a:ext cx="2971800" cy="458788"/>
+            <a:off x="0" y="1"/>
+            <a:ext cx="3037840" cy="466434"/>
           </a:xfrm>
           <a:prstGeom prst="rect">
             <a:avLst/>
           </a:prstGeom>
         </p:spPr>
         <p:txBody>
-          <a:bodyPr vert="horz" lIns="91440" tIns="45720" rIns="91440" bIns="45720" rtlCol="0"/>
+          <a:bodyPr vert="horz" lIns="93172" tIns="46587" rIns="93172" bIns="46587" rtlCol="0"/>
           <a:lstStyle>
             <a:lvl1pPr algn="l">
               <a:defRPr sz="1200"/>
@@ -3185,15 +2975,15 @@
         </p:nvSpPr>
         <p:spPr>
           <a:xfrm>
-            <a:off x="3884613" y="0"/>
-            <a:ext cx="2971800" cy="458788"/>
+            <a:off x="3970939" y="1"/>
+            <a:ext cx="3037840" cy="466434"/>
           </a:xfrm>
           <a:prstGeom prst="rect">
             <a:avLst/>
           </a:prstGeom>
         </p:spPr>
         <p:txBody>
-          <a:bodyPr vert="horz" lIns="91440" tIns="45720" rIns="91440" bIns="45720" rtlCol="0"/>
+          <a:bodyPr vert="horz" lIns="93172" tIns="46587" rIns="93172" bIns="46587" rtlCol="0"/>
           <a:lstStyle>
             <a:lvl1pPr algn="r">
               <a:defRPr sz="1200"/>
@@ -3202,7 +2992,7 @@
           <a:p>
             <a:fld id="{F6883597-B14F-4316-96C8-8EF59AEB1C81}" type="datetimeFigureOut">
               <a:rPr lang="en-US" smtClean="0"/>
-              <a:t>8/19/2015</a:t>
+              <a:t>9/9/2015</a:t>
             </a:fld>
             <a:endParaRPr lang="en-US"/>
           </a:p>
@@ -3220,8 +3010,8 @@
         </p:nvSpPr>
         <p:spPr>
           <a:xfrm>
-            <a:off x="685800" y="1143000"/>
-            <a:ext cx="5486400" cy="3086100"/>
+            <a:off x="717550" y="1162050"/>
+            <a:ext cx="5575300" cy="3136900"/>
           </a:xfrm>
           <a:prstGeom prst="rect">
             <a:avLst/>
@@ -3234,7 +3024,7 @@
           </a:ln>
         </p:spPr>
         <p:txBody>
-          <a:bodyPr vert="horz" lIns="91440" tIns="45720" rIns="91440" bIns="45720" rtlCol="0" anchor="ctr"/>
+          <a:bodyPr vert="horz" lIns="93172" tIns="46587" rIns="93172" bIns="46587" rtlCol="0" anchor="ctr"/>
           <a:lstStyle/>
           <a:p>
             <a:endParaRPr lang="en-US"/>
@@ -3253,15 +3043,15 @@
         </p:nvSpPr>
         <p:spPr>
           <a:xfrm>
-            <a:off x="685800" y="4400550"/>
-            <a:ext cx="5486400" cy="3600450"/>
+            <a:off x="701040" y="4473892"/>
+            <a:ext cx="5608320" cy="3660458"/>
           </a:xfrm>
           <a:prstGeom prst="rect">
             <a:avLst/>
           </a:prstGeom>
         </p:spPr>
         <p:txBody>
-          <a:bodyPr vert="horz" lIns="91440" tIns="45720" rIns="91440" bIns="45720" rtlCol="0"/>
+          <a:bodyPr vert="horz" lIns="93172" tIns="46587" rIns="93172" bIns="46587" rtlCol="0"/>
           <a:lstStyle/>
           <a:p>
             <a:pPr lvl="0"/>
@@ -3313,15 +3103,15 @@
         </p:nvSpPr>
         <p:spPr>
           <a:xfrm>
-            <a:off x="0" y="8685213"/>
-            <a:ext cx="2971800" cy="458787"/>
+            <a:off x="0" y="8829968"/>
+            <a:ext cx="3037840" cy="466433"/>
           </a:xfrm>
           <a:prstGeom prst="rect">
             <a:avLst/>
           </a:prstGeom>
         </p:spPr>
         <p:txBody>
-          <a:bodyPr vert="horz" lIns="91440" tIns="45720" rIns="91440" bIns="45720" rtlCol="0" anchor="b"/>
+          <a:bodyPr vert="horz" lIns="93172" tIns="46587" rIns="93172" bIns="46587" rtlCol="0" anchor="b"/>
           <a:lstStyle>
             <a:lvl1pPr algn="l">
               <a:defRPr sz="1200"/>
@@ -3344,15 +3134,15 @@
         </p:nvSpPr>
         <p:spPr>
           <a:xfrm>
-            <a:off x="3884613" y="8685213"/>
-            <a:ext cx="2971800" cy="458787"/>
+            <a:off x="3970939" y="8829968"/>
+            <a:ext cx="3037840" cy="466433"/>
           </a:xfrm>
           <a:prstGeom prst="rect">
             <a:avLst/>
           </a:prstGeom>
         </p:spPr>
         <p:txBody>
-          <a:bodyPr vert="horz" lIns="91440" tIns="45720" rIns="91440" bIns="45720" rtlCol="0" anchor="b"/>
+          <a:bodyPr vert="horz" lIns="93172" tIns="46587" rIns="93172" bIns="46587" rtlCol="0" anchor="b"/>
           <a:lstStyle>
             <a:lvl1pPr algn="r">
               <a:defRPr sz="1200"/>
@@ -3514,45 +3304,6 @@
           <a:bodyPr/>
           <a:lstStyle/>
           <a:p>
-            <a:r>
-              <a:rPr lang="en-US" dirty="0" smtClean="0"/>
-              <a:t>* In May 2006, researchers at Duke University, published the results of a promising new cancer diagnostic technique. Patients would have an 80% assurance that</a:t>
-            </a:r>
-            <a:r>
-              <a:rPr lang="en-US" baseline="0" dirty="0" smtClean="0"/>
-              <a:t> their treatment was specific to their form of cancer.</a:t>
-            </a:r>
-            <a:endParaRPr lang="en-US" dirty="0" smtClean="0"/>
-          </a:p>
-          <a:p>
-            <a:r>
-              <a:rPr lang="en-US" dirty="0" smtClean="0"/>
-              <a:t>* In January, 2010, as the world grappled with recession, two researchers published findings about the relationship between public debt and economic growth.</a:t>
-            </a:r>
-          </a:p>
-          <a:p>
-            <a:r>
-              <a:rPr lang="en-US" dirty="0" smtClean="0"/>
-              <a:t>* In September 2014, Vista Equity Partners purchased </a:t>
-            </a:r>
-            <a:r>
-              <a:rPr lang="en-US" dirty="0" err="1" smtClean="0"/>
-              <a:t>Tibco</a:t>
-            </a:r>
-            <a:r>
-              <a:rPr lang="en-US" dirty="0" smtClean="0"/>
-              <a:t>. Goldman Sachs had estimated </a:t>
-            </a:r>
-            <a:r>
-              <a:rPr lang="en-US" dirty="0" err="1" smtClean="0"/>
-              <a:t>Tibco’s</a:t>
-            </a:r>
-            <a:r>
-              <a:rPr lang="en-US" dirty="0" smtClean="0"/>
-              <a:t> value at $4.2 billion.</a:t>
-            </a:r>
-          </a:p>
-          <a:p>
             <a:endParaRPr lang="en-US" dirty="0"/>
           </a:p>
         </p:txBody>
@@ -3574,7 +3325,7 @@
           <a:p>
             <a:fld id="{8EE72CF3-5838-414C-9D89-9DDB0D946627}" type="slidenum">
               <a:rPr lang="en-US" smtClean="0"/>
-              <a:t>2</a:t>
+              <a:t>1</a:t>
             </a:fld>
             <a:endParaRPr lang="en-US"/>
           </a:p>
@@ -3583,7 +3334,7 @@
     </p:spTree>
     <p:extLst>
       <p:ext uri="{BB962C8B-B14F-4D97-AF65-F5344CB8AC3E}">
-        <p14:creationId xmlns:p14="http://schemas.microsoft.com/office/powerpoint/2010/main" val="2026610570"/>
+        <p14:creationId xmlns:p14="http://schemas.microsoft.com/office/powerpoint/2010/main" val="4277333378"/>
       </p:ext>
     </p:extLst>
   </p:cSld>
@@ -3639,8 +3390,43 @@
           <a:p>
             <a:r>
               <a:rPr lang="en-US" dirty="0" smtClean="0"/>
-              <a:t>Animate text to fade</a:t>
-            </a:r>
+              <a:t>* In May 2006, researchers at Duke University, published the results of a promising new cancer diagnostic technique. Patients would have an 80% assurance that</a:t>
+            </a:r>
+            <a:r>
+              <a:rPr lang="en-US" baseline="0" dirty="0" smtClean="0"/>
+              <a:t> their treatment was specific to their form of cancer.</a:t>
+            </a:r>
+            <a:endParaRPr lang="en-US" dirty="0" smtClean="0"/>
+          </a:p>
+          <a:p>
+            <a:r>
+              <a:rPr lang="en-US" dirty="0" smtClean="0"/>
+              <a:t>* In January, 2010, as the world grappled with recession, two researchers published findings about the relationship between public debt and economic growth.</a:t>
+            </a:r>
+          </a:p>
+          <a:p>
+            <a:r>
+              <a:rPr lang="en-US" dirty="0" smtClean="0"/>
+              <a:t>* In September 2014, Vista Equity Partners purchased </a:t>
+            </a:r>
+            <a:r>
+              <a:rPr lang="en-US" dirty="0" err="1" smtClean="0"/>
+              <a:t>Tibco</a:t>
+            </a:r>
+            <a:r>
+              <a:rPr lang="en-US" dirty="0" smtClean="0"/>
+              <a:t>. Goldman Sachs had estimated </a:t>
+            </a:r>
+            <a:r>
+              <a:rPr lang="en-US" dirty="0" err="1" smtClean="0"/>
+              <a:t>Tibco’s</a:t>
+            </a:r>
+            <a:r>
+              <a:rPr lang="en-US" dirty="0" smtClean="0"/>
+              <a:t> value at $4.2 billion.</a:t>
+            </a:r>
+          </a:p>
+          <a:p>
             <a:endParaRPr lang="en-US" dirty="0"/>
           </a:p>
         </p:txBody>
@@ -3662,7 +3448,7 @@
           <a:p>
             <a:fld id="{8EE72CF3-5838-414C-9D89-9DDB0D946627}" type="slidenum">
               <a:rPr lang="en-US" smtClean="0"/>
-              <a:t>4</a:t>
+              <a:t>2</a:t>
             </a:fld>
             <a:endParaRPr lang="en-US"/>
           </a:p>
@@ -3671,7 +3457,7 @@
     </p:spTree>
     <p:extLst>
       <p:ext uri="{BB962C8B-B14F-4D97-AF65-F5344CB8AC3E}">
-        <p14:creationId xmlns:p14="http://schemas.microsoft.com/office/powerpoint/2010/main" val="1212996966"/>
+        <p14:creationId xmlns:p14="http://schemas.microsoft.com/office/powerpoint/2010/main" val="2026610570"/>
       </p:ext>
     </p:extLst>
   </p:cSld>
@@ -3727,15 +3513,7 @@
           <a:p>
             <a:r>
               <a:rPr lang="en-US" dirty="0" smtClean="0"/>
-              <a:t>Animate appearance of </a:t>
-            </a:r>
-            <a:r>
-              <a:rPr lang="en-US" dirty="0" err="1" smtClean="0"/>
-              <a:t>git</a:t>
-            </a:r>
-            <a:r>
-              <a:rPr lang="en-US" dirty="0" smtClean="0"/>
-              <a:t> logo</a:t>
+              <a:t>Animate text to fade</a:t>
             </a:r>
             <a:endParaRPr lang="en-US" dirty="0"/>
           </a:p>
@@ -3758,7 +3536,7 @@
           <a:p>
             <a:fld id="{8EE72CF3-5838-414C-9D89-9DDB0D946627}" type="slidenum">
               <a:rPr lang="en-US" smtClean="0"/>
-              <a:t>8</a:t>
+              <a:t>4</a:t>
             </a:fld>
             <a:endParaRPr lang="en-US"/>
           </a:p>
@@ -3767,7 +3545,7 @@
     </p:spTree>
     <p:extLst>
       <p:ext uri="{BB962C8B-B14F-4D97-AF65-F5344CB8AC3E}">
-        <p14:creationId xmlns:p14="http://schemas.microsoft.com/office/powerpoint/2010/main" val="3659784875"/>
+        <p14:creationId xmlns:p14="http://schemas.microsoft.com/office/powerpoint/2010/main" val="1212996966"/>
       </p:ext>
     </p:extLst>
   </p:cSld>
@@ -3823,6 +3601,102 @@
           <a:p>
             <a:r>
               <a:rPr lang="en-US" dirty="0" smtClean="0"/>
+              <a:t>Animate appearance of </a:t>
+            </a:r>
+            <a:r>
+              <a:rPr lang="en-US" dirty="0" err="1" smtClean="0"/>
+              <a:t>git</a:t>
+            </a:r>
+            <a:r>
+              <a:rPr lang="en-US" dirty="0" smtClean="0"/>
+              <a:t> logo</a:t>
+            </a:r>
+            <a:endParaRPr lang="en-US" dirty="0"/>
+          </a:p>
+        </p:txBody>
+      </p:sp>
+      <p:sp>
+        <p:nvSpPr>
+          <p:cNvPr id="4" name="Slide Number Placeholder 3"/>
+          <p:cNvSpPr>
+            <a:spLocks noGrp="1"/>
+          </p:cNvSpPr>
+          <p:nvPr>
+            <p:ph type="sldNum" sz="quarter" idx="10"/>
+          </p:nvPr>
+        </p:nvSpPr>
+        <p:spPr/>
+        <p:txBody>
+          <a:bodyPr/>
+          <a:lstStyle/>
+          <a:p>
+            <a:fld id="{8EE72CF3-5838-414C-9D89-9DDB0D946627}" type="slidenum">
+              <a:rPr lang="en-US" smtClean="0"/>
+              <a:t>8</a:t>
+            </a:fld>
+            <a:endParaRPr lang="en-US"/>
+          </a:p>
+        </p:txBody>
+      </p:sp>
+    </p:spTree>
+    <p:extLst>
+      <p:ext uri="{BB962C8B-B14F-4D97-AF65-F5344CB8AC3E}">
+        <p14:creationId xmlns:p14="http://schemas.microsoft.com/office/powerpoint/2010/main" val="3659784875"/>
+      </p:ext>
+    </p:extLst>
+  </p:cSld>
+  <p:clrMapOvr>
+    <a:masterClrMapping/>
+  </p:clrMapOvr>
+</p:notes>
+</file>
+
+<file path=ppt/notesSlides/notesSlide5.xml><?xml version="1.0" encoding="utf-8"?>
+<p:notes xmlns:a="http://schemas.openxmlformats.org/drawingml/2006/main" xmlns:r="http://schemas.openxmlformats.org/officeDocument/2006/relationships" xmlns:p="http://schemas.openxmlformats.org/presentationml/2006/main">
+  <p:cSld>
+    <p:spTree>
+      <p:nvGrpSpPr>
+        <p:cNvPr id="1" name=""/>
+        <p:cNvGrpSpPr/>
+        <p:nvPr/>
+      </p:nvGrpSpPr>
+      <p:grpSpPr>
+        <a:xfrm>
+          <a:off x="0" y="0"/>
+          <a:ext cx="0" cy="0"/>
+          <a:chOff x="0" y="0"/>
+          <a:chExt cx="0" cy="0"/>
+        </a:xfrm>
+      </p:grpSpPr>
+      <p:sp>
+        <p:nvSpPr>
+          <p:cNvPr id="2" name="Slide Image Placeholder 1"/>
+          <p:cNvSpPr>
+            <a:spLocks noGrp="1" noRot="1" noChangeAspect="1"/>
+          </p:cNvSpPr>
+          <p:nvPr>
+            <p:ph type="sldImg"/>
+          </p:nvPr>
+        </p:nvSpPr>
+        <p:spPr/>
+      </p:sp>
+      <p:sp>
+        <p:nvSpPr>
+          <p:cNvPr id="3" name="Notes Placeholder 2"/>
+          <p:cNvSpPr>
+            <a:spLocks noGrp="1"/>
+          </p:cNvSpPr>
+          <p:nvPr>
+            <p:ph type="body" idx="1"/>
+          </p:nvPr>
+        </p:nvSpPr>
+        <p:spPr/>
+        <p:txBody>
+          <a:bodyPr/>
+          <a:lstStyle/>
+          <a:p>
+            <a:r>
+              <a:rPr lang="en-US" dirty="0" smtClean="0"/>
               <a:t>Each of these steps is likely repeated over and over again.</a:t>
             </a:r>
             <a:endParaRPr lang="en-US" dirty="0"/>
@@ -3856,6 +3730,174 @@
     <p:extLst>
       <p:ext uri="{BB962C8B-B14F-4D97-AF65-F5344CB8AC3E}">
         <p14:creationId xmlns:p14="http://schemas.microsoft.com/office/powerpoint/2010/main" val="2071526076"/>
+      </p:ext>
+    </p:extLst>
+  </p:cSld>
+  <p:clrMapOvr>
+    <a:masterClrMapping/>
+  </p:clrMapOvr>
+</p:notes>
+</file>
+
+<file path=ppt/notesSlides/notesSlide6.xml><?xml version="1.0" encoding="utf-8"?>
+<p:notes xmlns:a="http://schemas.openxmlformats.org/drawingml/2006/main" xmlns:r="http://schemas.openxmlformats.org/officeDocument/2006/relationships" xmlns:p="http://schemas.openxmlformats.org/presentationml/2006/main">
+  <p:cSld>
+    <p:spTree>
+      <p:nvGrpSpPr>
+        <p:cNvPr id="1" name=""/>
+        <p:cNvGrpSpPr/>
+        <p:nvPr/>
+      </p:nvGrpSpPr>
+      <p:grpSpPr>
+        <a:xfrm>
+          <a:off x="0" y="0"/>
+          <a:ext cx="0" cy="0"/>
+          <a:chOff x="0" y="0"/>
+          <a:chExt cx="0" cy="0"/>
+        </a:xfrm>
+      </p:grpSpPr>
+      <p:sp>
+        <p:nvSpPr>
+          <p:cNvPr id="2" name="Slide Image Placeholder 1"/>
+          <p:cNvSpPr>
+            <a:spLocks noGrp="1" noRot="1" noChangeAspect="1"/>
+          </p:cNvSpPr>
+          <p:nvPr>
+            <p:ph type="sldImg"/>
+          </p:nvPr>
+        </p:nvSpPr>
+        <p:spPr/>
+      </p:sp>
+      <p:sp>
+        <p:nvSpPr>
+          <p:cNvPr id="3" name="Notes Placeholder 2"/>
+          <p:cNvSpPr>
+            <a:spLocks noGrp="1"/>
+          </p:cNvSpPr>
+          <p:nvPr>
+            <p:ph type="body" idx="1"/>
+          </p:nvPr>
+        </p:nvSpPr>
+        <p:spPr/>
+        <p:txBody>
+          <a:bodyPr/>
+          <a:lstStyle/>
+          <a:p>
+            <a:endParaRPr lang="en-US" dirty="0"/>
+          </a:p>
+        </p:txBody>
+      </p:sp>
+      <p:sp>
+        <p:nvSpPr>
+          <p:cNvPr id="4" name="Slide Number Placeholder 3"/>
+          <p:cNvSpPr>
+            <a:spLocks noGrp="1"/>
+          </p:cNvSpPr>
+          <p:nvPr>
+            <p:ph type="sldNum" sz="quarter" idx="10"/>
+          </p:nvPr>
+        </p:nvSpPr>
+        <p:spPr/>
+        <p:txBody>
+          <a:bodyPr/>
+          <a:lstStyle/>
+          <a:p>
+            <a:fld id="{8EE72CF3-5838-414C-9D89-9DDB0D946627}" type="slidenum">
+              <a:rPr lang="en-US" smtClean="0"/>
+              <a:t>17</a:t>
+            </a:fld>
+            <a:endParaRPr lang="en-US"/>
+          </a:p>
+        </p:txBody>
+      </p:sp>
+    </p:spTree>
+    <p:extLst>
+      <p:ext uri="{BB962C8B-B14F-4D97-AF65-F5344CB8AC3E}">
+        <p14:creationId xmlns:p14="http://schemas.microsoft.com/office/powerpoint/2010/main" val="2091583396"/>
+      </p:ext>
+    </p:extLst>
+  </p:cSld>
+  <p:clrMapOvr>
+    <a:masterClrMapping/>
+  </p:clrMapOvr>
+</p:notes>
+</file>
+
+<file path=ppt/notesSlides/notesSlide7.xml><?xml version="1.0" encoding="utf-8"?>
+<p:notes xmlns:a="http://schemas.openxmlformats.org/drawingml/2006/main" xmlns:r="http://schemas.openxmlformats.org/officeDocument/2006/relationships" xmlns:p="http://schemas.openxmlformats.org/presentationml/2006/main">
+  <p:cSld>
+    <p:spTree>
+      <p:nvGrpSpPr>
+        <p:cNvPr id="1" name=""/>
+        <p:cNvGrpSpPr/>
+        <p:nvPr/>
+      </p:nvGrpSpPr>
+      <p:grpSpPr>
+        <a:xfrm>
+          <a:off x="0" y="0"/>
+          <a:ext cx="0" cy="0"/>
+          <a:chOff x="0" y="0"/>
+          <a:chExt cx="0" cy="0"/>
+        </a:xfrm>
+      </p:grpSpPr>
+      <p:sp>
+        <p:nvSpPr>
+          <p:cNvPr id="2" name="Slide Image Placeholder 1"/>
+          <p:cNvSpPr>
+            <a:spLocks noGrp="1" noRot="1" noChangeAspect="1"/>
+          </p:cNvSpPr>
+          <p:nvPr>
+            <p:ph type="sldImg"/>
+          </p:nvPr>
+        </p:nvSpPr>
+        <p:spPr/>
+      </p:sp>
+      <p:sp>
+        <p:nvSpPr>
+          <p:cNvPr id="3" name="Notes Placeholder 2"/>
+          <p:cNvSpPr>
+            <a:spLocks noGrp="1"/>
+          </p:cNvSpPr>
+          <p:nvPr>
+            <p:ph type="body" idx="1"/>
+          </p:nvPr>
+        </p:nvSpPr>
+        <p:spPr/>
+        <p:txBody>
+          <a:bodyPr/>
+          <a:lstStyle/>
+          <a:p>
+            <a:endParaRPr lang="en-US"/>
+          </a:p>
+        </p:txBody>
+      </p:sp>
+      <p:sp>
+        <p:nvSpPr>
+          <p:cNvPr id="4" name="Slide Number Placeholder 3"/>
+          <p:cNvSpPr>
+            <a:spLocks noGrp="1"/>
+          </p:cNvSpPr>
+          <p:nvPr>
+            <p:ph type="sldNum" sz="quarter" idx="10"/>
+          </p:nvPr>
+        </p:nvSpPr>
+        <p:spPr/>
+        <p:txBody>
+          <a:bodyPr/>
+          <a:lstStyle/>
+          <a:p>
+            <a:fld id="{8EE72CF3-5838-414C-9D89-9DDB0D946627}" type="slidenum">
+              <a:rPr lang="en-US" smtClean="0"/>
+              <a:t>19</a:t>
+            </a:fld>
+            <a:endParaRPr lang="en-US"/>
+          </a:p>
+        </p:txBody>
+      </p:sp>
+    </p:spTree>
+    <p:extLst>
+      <p:ext uri="{BB962C8B-B14F-4D97-AF65-F5344CB8AC3E}">
+        <p14:creationId xmlns:p14="http://schemas.microsoft.com/office/powerpoint/2010/main" val="3609316694"/>
       </p:ext>
     </p:extLst>
   </p:cSld>
@@ -3996,7 +4038,7 @@
           <a:p>
             <a:fld id="{C53C08D9-299C-46BC-8AE9-A81AD6C54D5C}" type="datetimeFigureOut">
               <a:rPr lang="en-US" smtClean="0"/>
-              <a:t>8/19/2015</a:t>
+              <a:t>9/9/2015</a:t>
             </a:fld>
             <a:endParaRPr lang="en-US"/>
           </a:p>
@@ -4166,7 +4208,7 @@
           <a:p>
             <a:fld id="{C53C08D9-299C-46BC-8AE9-A81AD6C54D5C}" type="datetimeFigureOut">
               <a:rPr lang="en-US" smtClean="0"/>
-              <a:t>8/19/2015</a:t>
+              <a:t>9/9/2015</a:t>
             </a:fld>
             <a:endParaRPr lang="en-US"/>
           </a:p>
@@ -4346,7 +4388,7 @@
           <a:p>
             <a:fld id="{C53C08D9-299C-46BC-8AE9-A81AD6C54D5C}" type="datetimeFigureOut">
               <a:rPr lang="en-US" smtClean="0"/>
-              <a:t>8/19/2015</a:t>
+              <a:t>9/9/2015</a:t>
             </a:fld>
             <a:endParaRPr lang="en-US"/>
           </a:p>
@@ -4516,7 +4558,7 @@
           <a:p>
             <a:fld id="{C53C08D9-299C-46BC-8AE9-A81AD6C54D5C}" type="datetimeFigureOut">
               <a:rPr lang="en-US" smtClean="0"/>
-              <a:t>8/19/2015</a:t>
+              <a:t>9/9/2015</a:t>
             </a:fld>
             <a:endParaRPr lang="en-US"/>
           </a:p>
@@ -4762,7 +4804,7 @@
           <a:p>
             <a:fld id="{C53C08D9-299C-46BC-8AE9-A81AD6C54D5C}" type="datetimeFigureOut">
               <a:rPr lang="en-US" smtClean="0"/>
-              <a:t>8/19/2015</a:t>
+              <a:t>9/9/2015</a:t>
             </a:fld>
             <a:endParaRPr lang="en-US"/>
           </a:p>
@@ -4994,7 +5036,7 @@
           <a:p>
             <a:fld id="{C53C08D9-299C-46BC-8AE9-A81AD6C54D5C}" type="datetimeFigureOut">
               <a:rPr lang="en-US" smtClean="0"/>
-              <a:t>8/19/2015</a:t>
+              <a:t>9/9/2015</a:t>
             </a:fld>
             <a:endParaRPr lang="en-US"/>
           </a:p>
@@ -5361,7 +5403,7 @@
           <a:p>
             <a:fld id="{C53C08D9-299C-46BC-8AE9-A81AD6C54D5C}" type="datetimeFigureOut">
               <a:rPr lang="en-US" smtClean="0"/>
-              <a:t>8/19/2015</a:t>
+              <a:t>9/9/2015</a:t>
             </a:fld>
             <a:endParaRPr lang="en-US"/>
           </a:p>
@@ -5479,7 +5521,7 @@
           <a:p>
             <a:fld id="{C53C08D9-299C-46BC-8AE9-A81AD6C54D5C}" type="datetimeFigureOut">
               <a:rPr lang="en-US" smtClean="0"/>
-              <a:t>8/19/2015</a:t>
+              <a:t>9/9/2015</a:t>
             </a:fld>
             <a:endParaRPr lang="en-US"/>
           </a:p>
@@ -5574,7 +5616,7 @@
           <a:p>
             <a:fld id="{C53C08D9-299C-46BC-8AE9-A81AD6C54D5C}" type="datetimeFigureOut">
               <a:rPr lang="en-US" smtClean="0"/>
-              <a:t>8/19/2015</a:t>
+              <a:t>9/9/2015</a:t>
             </a:fld>
             <a:endParaRPr lang="en-US"/>
           </a:p>
@@ -5851,7 +5893,7 @@
           <a:p>
             <a:fld id="{C53C08D9-299C-46BC-8AE9-A81AD6C54D5C}" type="datetimeFigureOut">
               <a:rPr lang="en-US" smtClean="0"/>
-              <a:t>8/19/2015</a:t>
+              <a:t>9/9/2015</a:t>
             </a:fld>
             <a:endParaRPr lang="en-US"/>
           </a:p>
@@ -6104,7 +6146,7 @@
           <a:p>
             <a:fld id="{C53C08D9-299C-46BC-8AE9-A81AD6C54D5C}" type="datetimeFigureOut">
               <a:rPr lang="en-US" smtClean="0"/>
-              <a:t>8/19/2015</a:t>
+              <a:t>9/9/2015</a:t>
             </a:fld>
             <a:endParaRPr lang="en-US"/>
           </a:p>
@@ -6317,7 +6359,7 @@
           <a:p>
             <a:fld id="{C53C08D9-299C-46BC-8AE9-A81AD6C54D5C}" type="datetimeFigureOut">
               <a:rPr lang="en-US" smtClean="0"/>
-              <a:t>8/19/2015</a:t>
+              <a:t>9/9/2015</a:t>
             </a:fld>
             <a:endParaRPr lang="en-US"/>
           </a:p>
@@ -9572,4 +9614,265 @@
     </a:ext>
   </a:extLst>
 </a:theme>
+</file>
+
+<file path=ppt/theme/theme3.xml><?xml version="1.0" encoding="utf-8"?>
+<a:theme xmlns:a="http://schemas.openxmlformats.org/drawingml/2006/main" name="Office Theme">
+  <a:themeElements>
+    <a:clrScheme name="Office">
+      <a:dk1>
+        <a:sysClr val="windowText" lastClr="000000"/>
+      </a:dk1>
+      <a:lt1>
+        <a:sysClr val="window" lastClr="FFFFFF"/>
+      </a:lt1>
+      <a:dk2>
+        <a:srgbClr val="44546A"/>
+      </a:dk2>
+      <a:lt2>
+        <a:srgbClr val="E7E6E6"/>
+      </a:lt2>
+      <a:accent1>
+        <a:srgbClr val="5B9BD5"/>
+      </a:accent1>
+      <a:accent2>
+        <a:srgbClr val="ED7D31"/>
+      </a:accent2>
+      <a:accent3>
+        <a:srgbClr val="A5A5A5"/>
+      </a:accent3>
+      <a:accent4>
+        <a:srgbClr val="FFC000"/>
+      </a:accent4>
+      <a:accent5>
+        <a:srgbClr val="4472C4"/>
+      </a:accent5>
+      <a:accent6>
+        <a:srgbClr val="70AD47"/>
+      </a:accent6>
+      <a:hlink>
+        <a:srgbClr val="0563C1"/>
+      </a:hlink>
+      <a:folHlink>
+        <a:srgbClr val="954F72"/>
+      </a:folHlink>
+    </a:clrScheme>
+    <a:fontScheme name="Office">
+      <a:majorFont>
+        <a:latin typeface="Calibri Light" panose="020F0302020204030204"/>
+        <a:ea typeface=""/>
+        <a:cs typeface=""/>
+        <a:font script="Jpan" typeface="ＭＳ Ｐゴシック"/>
+        <a:font script="Hang" typeface="맑은 고딕"/>
+        <a:font script="Hans" typeface="宋体"/>
+        <a:font script="Hant" typeface="新細明體"/>
+        <a:font script="Arab" typeface="Times New Roman"/>
+        <a:font script="Hebr" typeface="Times New Roman"/>
+        <a:font script="Thai" typeface="Angsana New"/>
+        <a:font script="Ethi" typeface="Nyala"/>
+        <a:font script="Beng" typeface="Vrinda"/>
+        <a:font script="Gujr" typeface="Shruti"/>
+        <a:font script="Khmr" typeface="MoolBoran"/>
+        <a:font script="Knda" typeface="Tunga"/>
+        <a:font script="Guru" typeface="Raavi"/>
+        <a:font script="Cans" typeface="Euphemia"/>
+        <a:font script="Cher" typeface="Plantagenet Cherokee"/>
+        <a:font script="Yiii" typeface="Microsoft Yi Baiti"/>
+        <a:font script="Tibt" typeface="Microsoft Himalaya"/>
+        <a:font script="Thaa" typeface="MV Boli"/>
+        <a:font script="Deva" typeface="Mangal"/>
+        <a:font script="Telu" typeface="Gautami"/>
+        <a:font script="Taml" typeface="Latha"/>
+        <a:font script="Syrc" typeface="Estrangelo Edessa"/>
+        <a:font script="Orya" typeface="Kalinga"/>
+        <a:font script="Mlym" typeface="Kartika"/>
+        <a:font script="Laoo" typeface="DokChampa"/>
+        <a:font script="Sinh" typeface="Iskoola Pota"/>
+        <a:font script="Mong" typeface="Mongolian Baiti"/>
+        <a:font script="Viet" typeface="Times New Roman"/>
+        <a:font script="Uigh" typeface="Microsoft Uighur"/>
+        <a:font script="Geor" typeface="Sylfaen"/>
+      </a:majorFont>
+      <a:minorFont>
+        <a:latin typeface="Calibri" panose="020F0502020204030204"/>
+        <a:ea typeface=""/>
+        <a:cs typeface=""/>
+        <a:font script="Jpan" typeface="ＭＳ Ｐゴシック"/>
+        <a:font script="Hang" typeface="맑은 고딕"/>
+        <a:font script="Hans" typeface="宋体"/>
+        <a:font script="Hant" typeface="新細明體"/>
+        <a:font script="Arab" typeface="Arial"/>
+        <a:font script="Hebr" typeface="Arial"/>
+        <a:font script="Thai" typeface="Cordia New"/>
+        <a:font script="Ethi" typeface="Nyala"/>
+        <a:font script="Beng" typeface="Vrinda"/>
+        <a:font script="Gujr" typeface="Shruti"/>
+        <a:font script="Khmr" typeface="DaunPenh"/>
+        <a:font script="Knda" typeface="Tunga"/>
+        <a:font script="Guru" typeface="Raavi"/>
+        <a:font script="Cans" typeface="Euphemia"/>
+        <a:font script="Cher" typeface="Plantagenet Cherokee"/>
+        <a:font script="Yiii" typeface="Microsoft Yi Baiti"/>
+        <a:font script="Tibt" typeface="Microsoft Himalaya"/>
+        <a:font script="Thaa" typeface="MV Boli"/>
+        <a:font script="Deva" typeface="Mangal"/>
+        <a:font script="Telu" typeface="Gautami"/>
+        <a:font script="Taml" typeface="Latha"/>
+        <a:font script="Syrc" typeface="Estrangelo Edessa"/>
+        <a:font script="Orya" typeface="Kalinga"/>
+        <a:font script="Mlym" typeface="Kartika"/>
+        <a:font script="Laoo" typeface="DokChampa"/>
+        <a:font script="Sinh" typeface="Iskoola Pota"/>
+        <a:font script="Mong" typeface="Mongolian Baiti"/>
+        <a:font script="Viet" typeface="Arial"/>
+        <a:font script="Uigh" typeface="Microsoft Uighur"/>
+        <a:font script="Geor" typeface="Sylfaen"/>
+      </a:minorFont>
+    </a:fontScheme>
+    <a:fmtScheme name="Office">
+      <a:fillStyleLst>
+        <a:solidFill>
+          <a:schemeClr val="phClr"/>
+        </a:solidFill>
+        <a:gradFill rotWithShape="1">
+          <a:gsLst>
+            <a:gs pos="0">
+              <a:schemeClr val="phClr">
+                <a:lumMod val="110000"/>
+                <a:satMod val="105000"/>
+                <a:tint val="67000"/>
+              </a:schemeClr>
+            </a:gs>
+            <a:gs pos="50000">
+              <a:schemeClr val="phClr">
+                <a:lumMod val="105000"/>
+                <a:satMod val="103000"/>
+                <a:tint val="73000"/>
+              </a:schemeClr>
+            </a:gs>
+            <a:gs pos="100000">
+              <a:schemeClr val="phClr">
+                <a:lumMod val="105000"/>
+                <a:satMod val="109000"/>
+                <a:tint val="81000"/>
+              </a:schemeClr>
+            </a:gs>
+          </a:gsLst>
+          <a:lin ang="5400000" scaled="0"/>
+        </a:gradFill>
+        <a:gradFill rotWithShape="1">
+          <a:gsLst>
+            <a:gs pos="0">
+              <a:schemeClr val="phClr">
+                <a:satMod val="103000"/>
+                <a:lumMod val="102000"/>
+                <a:tint val="94000"/>
+              </a:schemeClr>
+            </a:gs>
+            <a:gs pos="50000">
+              <a:schemeClr val="phClr">
+                <a:satMod val="110000"/>
+                <a:lumMod val="100000"/>
+                <a:shade val="100000"/>
+              </a:schemeClr>
+            </a:gs>
+            <a:gs pos="100000">
+              <a:schemeClr val="phClr">
+                <a:lumMod val="99000"/>
+                <a:satMod val="120000"/>
+                <a:shade val="78000"/>
+              </a:schemeClr>
+            </a:gs>
+          </a:gsLst>
+          <a:lin ang="5400000" scaled="0"/>
+        </a:gradFill>
+      </a:fillStyleLst>
+      <a:lnStyleLst>
+        <a:ln w="6350" cap="flat" cmpd="sng" algn="ctr">
+          <a:solidFill>
+            <a:schemeClr val="phClr"/>
+          </a:solidFill>
+          <a:prstDash val="solid"/>
+          <a:miter lim="800000"/>
+        </a:ln>
+        <a:ln w="12700" cap="flat" cmpd="sng" algn="ctr">
+          <a:solidFill>
+            <a:schemeClr val="phClr"/>
+          </a:solidFill>
+          <a:prstDash val="solid"/>
+          <a:miter lim="800000"/>
+        </a:ln>
+        <a:ln w="19050" cap="flat" cmpd="sng" algn="ctr">
+          <a:solidFill>
+            <a:schemeClr val="phClr"/>
+          </a:solidFill>
+          <a:prstDash val="solid"/>
+          <a:miter lim="800000"/>
+        </a:ln>
+      </a:lnStyleLst>
+      <a:effectStyleLst>
+        <a:effectStyle>
+          <a:effectLst/>
+        </a:effectStyle>
+        <a:effectStyle>
+          <a:effectLst/>
+        </a:effectStyle>
+        <a:effectStyle>
+          <a:effectLst>
+            <a:outerShdw blurRad="57150" dist="19050" dir="5400000" algn="ctr" rotWithShape="0">
+              <a:srgbClr val="000000">
+                <a:alpha val="63000"/>
+              </a:srgbClr>
+            </a:outerShdw>
+          </a:effectLst>
+        </a:effectStyle>
+      </a:effectStyleLst>
+      <a:bgFillStyleLst>
+        <a:solidFill>
+          <a:schemeClr val="phClr"/>
+        </a:solidFill>
+        <a:solidFill>
+          <a:schemeClr val="phClr">
+            <a:tint val="95000"/>
+            <a:satMod val="170000"/>
+          </a:schemeClr>
+        </a:solidFill>
+        <a:gradFill rotWithShape="1">
+          <a:gsLst>
+            <a:gs pos="0">
+              <a:schemeClr val="phClr">
+                <a:tint val="93000"/>
+                <a:satMod val="150000"/>
+                <a:shade val="98000"/>
+                <a:lumMod val="102000"/>
+              </a:schemeClr>
+            </a:gs>
+            <a:gs pos="50000">
+              <a:schemeClr val="phClr">
+                <a:tint val="98000"/>
+                <a:satMod val="130000"/>
+                <a:shade val="90000"/>
+                <a:lumMod val="103000"/>
+              </a:schemeClr>
+            </a:gs>
+            <a:gs pos="100000">
+              <a:schemeClr val="phClr">
+                <a:shade val="63000"/>
+                <a:satMod val="120000"/>
+              </a:schemeClr>
+            </a:gs>
+          </a:gsLst>
+          <a:lin ang="5400000" scaled="0"/>
+        </a:gradFill>
+      </a:bgFillStyleLst>
+    </a:fmtScheme>
+  </a:themeElements>
+  <a:objectDefaults/>
+  <a:extraClrSchemeLst/>
+  <a:extLst>
+    <a:ext uri="{05A4C25C-085E-4340-85A3-A5531E510DB2}">
+      <thm15:themeFamily xmlns:thm15="http://schemas.microsoft.com/office/thememl/2012/main" name="Office Theme" id="{62F939B6-93AF-4DB8-9C6B-D6C7DFDC589F}" vid="{4A3C46E8-61CC-4603-A589-7422A47A8E4A}"/>
+    </a:ext>
+  </a:extLst>
+</a:theme>
 </file>
</xml_diff>